<commit_message>
more slides, notebook for julia examples
</commit_message>
<xml_diff>
--- a/bayes/deeper-data-bayes.pptx
+++ b/bayes/deeper-data-bayes.pptx
@@ -8,7 +8,7 @@
     <p:notesMasterId r:id="rId4"/>
   </p:notesMasterIdLst>
   <p:handoutMasterIdLst>
-    <p:handoutMasterId r:id="rId34"/>
+    <p:handoutMasterId r:id="rId41"/>
   </p:handoutMasterIdLst>
   <p:sldIdLst>
     <p:sldId id="427" r:id="rId3"/>
@@ -29,18 +29,25 @@
     <p:sldId id="1201" r:id="rId19"/>
     <p:sldId id="1188" r:id="rId20"/>
     <p:sldId id="1202" r:id="rId21"/>
-    <p:sldId id="1203" r:id="rId22"/>
-    <p:sldId id="675" r:id="rId23"/>
-    <p:sldId id="676" r:id="rId24"/>
-    <p:sldId id="677" r:id="rId25"/>
-    <p:sldId id="678" r:id="rId26"/>
-    <p:sldId id="679" r:id="rId27"/>
-    <p:sldId id="680" r:id="rId28"/>
-    <p:sldId id="681" r:id="rId29"/>
-    <p:sldId id="682" r:id="rId30"/>
-    <p:sldId id="683" r:id="rId31"/>
-    <p:sldId id="684" r:id="rId32"/>
-    <p:sldId id="685" r:id="rId33"/>
+    <p:sldId id="1219" r:id="rId22"/>
+    <p:sldId id="1220" r:id="rId23"/>
+    <p:sldId id="1203" r:id="rId24"/>
+    <p:sldId id="1234" r:id="rId25"/>
+    <p:sldId id="1235" r:id="rId26"/>
+    <p:sldId id="1236" r:id="rId27"/>
+    <p:sldId id="675" r:id="rId28"/>
+    <p:sldId id="676" r:id="rId29"/>
+    <p:sldId id="677" r:id="rId30"/>
+    <p:sldId id="678" r:id="rId31"/>
+    <p:sldId id="679" r:id="rId32"/>
+    <p:sldId id="680" r:id="rId33"/>
+    <p:sldId id="681" r:id="rId34"/>
+    <p:sldId id="682" r:id="rId35"/>
+    <p:sldId id="683" r:id="rId36"/>
+    <p:sldId id="684" r:id="rId37"/>
+    <p:sldId id="685" r:id="rId38"/>
+    <p:sldId id="1237" r:id="rId39"/>
+    <p:sldId id="1238" r:id="rId40"/>
   </p:sldIdLst>
   <p:sldSz cx="9144000" cy="6858000" type="screen4x3"/>
   <p:notesSz cx="6858000" cy="9144000"/>
@@ -176,8 +183,28 @@
           <p14:sldIdLst>
             <p14:sldId id="427"/>
             <p14:sldId id="1186"/>
+            <p14:sldId id="1191"/>
             <p14:sldId id="1189"/>
             <p14:sldId id="1190"/>
+            <p14:sldId id="1187"/>
+            <p14:sldId id="1192"/>
+            <p14:sldId id="1193"/>
+            <p14:sldId id="1194"/>
+            <p14:sldId id="1195"/>
+            <p14:sldId id="1196"/>
+            <p14:sldId id="1198"/>
+            <p14:sldId id="1199"/>
+            <p14:sldId id="1200"/>
+            <p14:sldId id="1197"/>
+            <p14:sldId id="1201"/>
+            <p14:sldId id="1188"/>
+            <p14:sldId id="1202"/>
+            <p14:sldId id="1219"/>
+            <p14:sldId id="1220"/>
+            <p14:sldId id="1203"/>
+            <p14:sldId id="1234"/>
+            <p14:sldId id="1235"/>
+            <p14:sldId id="1236"/>
             <p14:sldId id="675"/>
             <p14:sldId id="676"/>
             <p14:sldId id="677"/>
@@ -189,21 +216,8 @@
             <p14:sldId id="683"/>
             <p14:sldId id="684"/>
             <p14:sldId id="685"/>
-            <p14:sldId id="1191"/>
-            <p14:sldId id="1187"/>
-            <p14:sldId id="1192"/>
-            <p14:sldId id="1193"/>
-            <p14:sldId id="1194"/>
-            <p14:sldId id="1195"/>
-            <p14:sldId id="1196"/>
-            <p14:sldId id="1199"/>
-            <p14:sldId id="1200"/>
-            <p14:sldId id="1197"/>
-            <p14:sldId id="1201"/>
-            <p14:sldId id="1198"/>
-            <p14:sldId id="1188"/>
-            <p14:sldId id="1202"/>
-            <p14:sldId id="1203"/>
+            <p14:sldId id="1237"/>
+            <p14:sldId id="1238"/>
           </p14:sldIdLst>
         </p14:section>
       </p14:sectionLst>
@@ -947,14 +961,18 @@
           <a:lstStyle/>
           <a:p>
             <a:r>
-              <a:rPr lang="en-US" dirty="0" smtClean="0"/>
-              <a:t>Just to</a:t>
-            </a:r>
-            <a:r>
-              <a:rPr lang="en-US" baseline="0" dirty="0" smtClean="0"/>
-              <a:t> give you a sense of how this works, </a:t>
-            </a:r>
-            <a:endParaRPr lang="en-US" dirty="0"/>
+              <a:rPr lang="" altLang="en-US" dirty="0"/>
+              <a:t>I think it's actually easier to think about how this works when we have a </a:t>
+            </a:r>
+            <a:r>
+              <a:rPr lang="" altLang="en-US" b="1" dirty="0"/>
+              <a:t>sample</a:t>
+            </a:r>
+            <a:r>
+              <a:rPr lang="" altLang="en-US" dirty="0"/>
+              <a:t> from our prior distribution over parameters...an approximation of our prior distribution using a randomly chosen set of “representative values”</a:t>
+            </a:r>
+            <a:endParaRPr lang="" altLang="en-US" dirty="0"/>
           </a:p>
         </p:txBody>
       </p:sp>
@@ -4127,10 +4145,10 @@
               </a:lnSpc>
             </a:pPr>
             <a:r>
-              <a:rPr lang="" altLang="en-US" sz="6600" cap="none" dirty="0"/>
+              <a:rPr lang="en-US" altLang="en-US" sz="6600" cap="none" dirty="0"/>
               <a:t>Bayesian inference</a:t>
             </a:r>
-            <a:endParaRPr lang="" altLang="x-none" sz="6600" b="0" cap="none" dirty="0"/>
+            <a:endParaRPr lang="en-US" altLang="x-none" sz="6600" b="0" cap="none" dirty="0"/>
           </a:p>
         </p:txBody>
       </p:sp>
@@ -4172,7 +4190,7 @@
           <a:p>
             <a:pPr algn="l"/>
             <a:r>
-              <a:rPr lang="" altLang="en-US" sz="2400" dirty="0" smtClean="0"/>
+              <a:rPr lang="en-US" altLang="en-US" sz="2400" dirty="0" smtClean="0"/>
               <a:t>Deeper data analysis</a:t>
             </a:r>
             <a:r>
@@ -4184,10 +4202,10 @@
               <a:t>// </a:t>
             </a:r>
             <a:r>
-              <a:rPr lang="" altLang="x-none" sz="2400" dirty="0" smtClean="0"/>
+              <a:rPr lang="en-US" altLang="x-none" sz="2400" dirty="0" smtClean="0"/>
               <a:t>26 Feb 2020</a:t>
             </a:r>
-            <a:endParaRPr lang="" altLang="x-none" sz="2400" dirty="0" smtClean="0"/>
+            <a:endParaRPr lang="en-US" altLang="x-none" sz="2400" dirty="0" smtClean="0"/>
           </a:p>
         </p:txBody>
       </p:sp>
@@ -4231,10 +4249,10 @@
           <a:bodyPr/>
           <a:p>
             <a:r>
-              <a:rPr lang="" altLang="en-US"/>
+              <a:rPr lang="en-US" altLang="en-US"/>
               <a:t>Frequentist probability</a:t>
             </a:r>
-            <a:endParaRPr lang="" altLang="en-US"/>
+            <a:endParaRPr lang="en-US" altLang="en-US"/>
           </a:p>
         </p:txBody>
       </p:sp>
@@ -4253,49 +4271,49 @@
           <a:bodyPr/>
           <a:p>
             <a:r>
-              <a:rPr lang="" altLang="en-US"/>
+              <a:rPr lang="en-US" altLang="en-US"/>
               <a:t>Why can’t we just “turn this around” and talk about </a:t>
             </a:r>
             <a:r>
-              <a:rPr lang="" altLang="en-US" i="1"/>
+              <a:rPr lang="en-US" altLang="en-US" i="1"/>
               <a:t>p(mean | data)</a:t>
             </a:r>
             <a:r>
-              <a:rPr lang="" altLang="en-US"/>
+              <a:rPr lang="en-US" altLang="en-US"/>
               <a:t>??</a:t>
             </a:r>
-            <a:endParaRPr lang="" altLang="en-US"/>
+            <a:endParaRPr lang="en-US" altLang="en-US"/>
           </a:p>
           <a:p>
             <a:pPr lvl="1"/>
             <a:r>
-              <a:rPr lang="" altLang="en-US"/>
+              <a:rPr lang="en-US" altLang="en-US"/>
               <a:t>(We can, mathematically; stay tuned)</a:t>
             </a:r>
-            <a:endParaRPr lang="" altLang="en-US"/>
-          </a:p>
-          <a:p>
-            <a:r>
-              <a:rPr lang="" altLang="en-US"/>
+            <a:endParaRPr lang="en-US" altLang="en-US"/>
+          </a:p>
+          <a:p>
+            <a:r>
+              <a:rPr lang="en-US" altLang="en-US"/>
               <a:t>Frequentists insist that parameters like </a:t>
             </a:r>
             <a:r>
-              <a:rPr lang="" altLang="en-US" i="1"/>
+              <a:rPr lang="en-US" altLang="en-US" i="1"/>
               <a:t>mean</a:t>
             </a:r>
             <a:r>
-              <a:rPr lang="" altLang="en-US"/>
+              <a:rPr lang="en-US" altLang="en-US"/>
               <a:t> have a single, true value (known to God), and therefore it is </a:t>
             </a:r>
             <a:r>
-              <a:rPr lang="" altLang="en-US" b="1"/>
+              <a:rPr lang="en-US" altLang="en-US" b="1"/>
               <a:t>nonsensical </a:t>
             </a:r>
             <a:r>
-              <a:rPr lang="" altLang="en-US"/>
+              <a:rPr lang="en-US" altLang="en-US"/>
               <a:t>to talk about probabilities of other values</a:t>
             </a:r>
-            <a:endParaRPr lang="" altLang="en-US"/>
+            <a:endParaRPr lang="en-US" altLang="en-US"/>
           </a:p>
         </p:txBody>
       </p:sp>
@@ -4353,10 +4371,10 @@
           <a:bodyPr/>
           <a:p>
             <a:r>
-              <a:rPr lang="" altLang="en-US"/>
+              <a:rPr lang="en-US" altLang="en-US"/>
               <a:t>Frequentist probability</a:t>
             </a:r>
-            <a:endParaRPr lang="" altLang="en-US"/>
+            <a:endParaRPr lang="en-US" altLang="en-US"/>
           </a:p>
         </p:txBody>
       </p:sp>
@@ -4375,33 +4393,33 @@
           <a:bodyPr/>
           <a:p>
             <a:r>
-              <a:rPr lang="" altLang="en-US"/>
+              <a:rPr lang="en-US" altLang="en-US"/>
               <a:t>Frequentist statistics is the way it is because of an </a:t>
             </a:r>
             <a:r>
-              <a:rPr lang="" altLang="en-US" b="1"/>
+              <a:rPr lang="en-US" altLang="en-US" b="1"/>
               <a:t>interpretation</a:t>
             </a:r>
             <a:r>
-              <a:rPr lang="" altLang="en-US"/>
+              <a:rPr lang="en-US" altLang="en-US"/>
               <a:t> of probability itself</a:t>
             </a:r>
-            <a:endParaRPr lang="" altLang="en-US"/>
-          </a:p>
-          <a:p>
-            <a:r>
-              <a:rPr lang="" altLang="en-US"/>
+            <a:endParaRPr lang="en-US" altLang="en-US"/>
+          </a:p>
+          <a:p>
+            <a:r>
+              <a:rPr lang="en-US" altLang="en-US"/>
               <a:t>There are </a:t>
             </a:r>
             <a:r>
-              <a:rPr lang="" altLang="en-US" b="1"/>
+              <a:rPr lang="en-US" altLang="en-US" b="1"/>
               <a:t>other possible interpretations</a:t>
             </a:r>
             <a:r>
-              <a:rPr lang="" altLang="en-US"/>
+              <a:rPr lang="en-US" altLang="en-US"/>
               <a:t>!</a:t>
             </a:r>
-            <a:endParaRPr lang="" altLang="en-US"/>
+            <a:endParaRPr lang="en-US" altLang="en-US"/>
           </a:p>
         </p:txBody>
       </p:sp>
@@ -4459,10 +4477,10 @@
           <a:bodyPr/>
           <a:p>
             <a:r>
-              <a:rPr lang="" altLang="en-US"/>
+              <a:rPr lang="en-US" altLang="en-US"/>
               <a:t>Bayesian probability</a:t>
             </a:r>
-            <a:endParaRPr lang="" altLang="en-US"/>
+            <a:endParaRPr lang="en-US" altLang="en-US"/>
           </a:p>
         </p:txBody>
       </p:sp>
@@ -4481,60 +4499,60 @@
           <a:bodyPr/>
           <a:p>
             <a:r>
-              <a:rPr lang="" altLang="en-US"/>
+              <a:rPr lang="en-US" altLang="en-US"/>
               <a:t>Who’s heard of “Bayes’ theorem/rule”?</a:t>
             </a:r>
-            <a:endParaRPr lang="" altLang="en-US"/>
-          </a:p>
-          <a:p>
-            <a:r>
-              <a:rPr lang="" altLang="en-US"/>
+            <a:endParaRPr lang="en-US" altLang="en-US"/>
+          </a:p>
+          <a:p>
+            <a:r>
+              <a:rPr lang="en-US" altLang="en-US"/>
               <a:t>p(H | D) = p(D | H) p(H) / p(D)</a:t>
             </a:r>
-            <a:endParaRPr lang="" altLang="en-US"/>
+            <a:endParaRPr lang="en-US" altLang="en-US"/>
           </a:p>
           <a:p>
             <a:pPr lvl="1"/>
             <a:r>
-              <a:rPr lang="" altLang="en-US" sz="2800"/>
+              <a:rPr lang="en-US" altLang="en-US" sz="2800"/>
               <a:t>H = “hypothesis”, D = “data”</a:t>
             </a:r>
-            <a:endParaRPr lang="" altLang="en-US"/>
+            <a:endParaRPr lang="en-US" altLang="en-US"/>
           </a:p>
           <a:p>
             <a:pPr lvl="0"/>
             <a:r>
-              <a:rPr lang="" altLang="en-US"/>
+              <a:rPr lang="en-US" altLang="en-US"/>
               <a:t>Not a major </a:t>
             </a:r>
             <a:r>
-              <a:rPr lang="" altLang="en-US" b="1"/>
+              <a:rPr lang="en-US" altLang="en-US" b="1"/>
               <a:t>insight</a:t>
             </a:r>
             <a:r>
-              <a:rPr lang="" altLang="en-US"/>
+              <a:rPr lang="en-US" altLang="en-US"/>
               <a:t> or </a:t>
             </a:r>
             <a:r>
-              <a:rPr lang="" altLang="en-US" b="1"/>
+              <a:rPr lang="en-US" altLang="en-US" b="1"/>
               <a:t>theorem</a:t>
             </a:r>
             <a:r>
-              <a:rPr lang="" altLang="en-US"/>
+              <a:rPr lang="en-US" altLang="en-US"/>
               <a:t>, rather a </a:t>
             </a:r>
             <a:r>
-              <a:rPr lang="" altLang="en-US" b="1"/>
+              <a:rPr lang="en-US" altLang="en-US" b="1"/>
               <a:t>reinterpretation</a:t>
             </a:r>
             <a:r>
-              <a:rPr lang="" altLang="en-US"/>
+              <a:rPr lang="en-US" altLang="en-US"/>
               <a:t> of what probability means</a:t>
             </a:r>
-            <a:endParaRPr lang="" altLang="en-US"/>
-          </a:p>
-          <a:p>
-            <a:endParaRPr lang="" altLang="en-US"/>
+            <a:endParaRPr lang="en-US" altLang="en-US"/>
+          </a:p>
+          <a:p>
+            <a:endParaRPr lang="en-US" altLang="en-US"/>
           </a:p>
         </p:txBody>
       </p:sp>
@@ -4592,10 +4610,10 @@
           <a:bodyPr/>
           <a:p>
             <a:r>
-              <a:rPr lang="" altLang="en-US"/>
+              <a:rPr lang="en-US" altLang="en-US"/>
               <a:t>Bayesian probability</a:t>
             </a:r>
-            <a:endParaRPr lang="" altLang="en-US"/>
+            <a:endParaRPr lang="en-US" altLang="en-US"/>
           </a:p>
         </p:txBody>
       </p:sp>
@@ -4614,74 +4632,74 @@
           <a:bodyPr/>
           <a:p>
             <a:r>
-              <a:rPr lang="" altLang="en-US"/>
+              <a:rPr lang="en-US" altLang="en-US"/>
               <a:t>Basic axiom of </a:t>
             </a:r>
             <a:r>
-              <a:rPr lang="" altLang="en-US" b="1"/>
+              <a:rPr lang="en-US" altLang="en-US" b="1"/>
               <a:t>conditional probability</a:t>
             </a:r>
             <a:r>
-              <a:rPr lang="" altLang="en-US"/>
+              <a:rPr lang="en-US" altLang="en-US"/>
               <a:t>:</a:t>
             </a:r>
-            <a:endParaRPr lang="" altLang="en-US"/>
+            <a:endParaRPr lang="en-US" altLang="en-US"/>
           </a:p>
           <a:p>
             <a:pPr lvl="1"/>
             <a:r>
-              <a:rPr lang="" altLang="en-US"/>
+              <a:rPr lang="en-US" altLang="en-US"/>
               <a:t>p(A, B) = p(A | B) p(B)</a:t>
             </a:r>
-            <a:endParaRPr lang="" altLang="en-US"/>
+            <a:endParaRPr lang="en-US" altLang="en-US"/>
           </a:p>
           <a:p>
             <a:pPr lvl="1"/>
             <a:r>
-              <a:rPr lang="" altLang="en-US"/>
+              <a:rPr lang="en-US" altLang="en-US"/>
               <a:t>p(A, B) = p(B | A) p(A)</a:t>
             </a:r>
-            <a:endParaRPr lang="" altLang="en-US"/>
+            <a:endParaRPr lang="en-US" altLang="en-US"/>
           </a:p>
           <a:p>
             <a:pPr lvl="0"/>
             <a:r>
-              <a:rPr lang="" altLang="en-US"/>
+              <a:rPr lang="en-US" altLang="en-US"/>
               <a:t>Example</a:t>
             </a:r>
-            <a:endParaRPr lang="" altLang="en-US"/>
+            <a:endParaRPr lang="en-US" altLang="en-US"/>
           </a:p>
           <a:p>
             <a:pPr lvl="1"/>
             <a:r>
-              <a:rPr lang="" altLang="en-US" sz="2800"/>
+              <a:rPr lang="en-US" altLang="en-US" sz="2800"/>
               <a:t>B = “wearing a coat?”, A = “raining?”</a:t>
             </a:r>
-            <a:endParaRPr lang="" altLang="en-US"/>
+            <a:endParaRPr lang="en-US" altLang="en-US"/>
           </a:p>
           <a:p>
             <a:pPr lvl="0"/>
             <a:r>
-              <a:rPr lang="" altLang="en-US"/>
+              <a:rPr lang="en-US" altLang="en-US"/>
               <a:t>so...</a:t>
             </a:r>
-            <a:endParaRPr lang="" altLang="en-US"/>
+            <a:endParaRPr lang="en-US" altLang="en-US"/>
           </a:p>
           <a:p>
             <a:pPr lvl="1"/>
             <a:r>
-              <a:rPr lang="" altLang="en-US"/>
+              <a:rPr lang="en-US" altLang="en-US"/>
               <a:t>p(A | B) p(B) = p(B | A) p(A)</a:t>
             </a:r>
-            <a:endParaRPr lang="" altLang="en-US"/>
+            <a:endParaRPr lang="en-US" altLang="en-US"/>
           </a:p>
           <a:p>
             <a:pPr lvl="1"/>
             <a:r>
-              <a:rPr lang="" altLang="en-US"/>
+              <a:rPr lang="en-US" altLang="en-US"/>
               <a:t>p(A | B) = p(B | A) p(A) / p(B)</a:t>
             </a:r>
-            <a:endParaRPr lang="" altLang="en-US"/>
+            <a:endParaRPr lang="en-US" altLang="en-US"/>
           </a:p>
         </p:txBody>
       </p:sp>
@@ -5074,10 +5092,10 @@
           <a:bodyPr/>
           <a:p>
             <a:r>
-              <a:rPr lang="" altLang="en-US"/>
+              <a:rPr lang="en-US" altLang="en-US"/>
               <a:t>Bayesian probability</a:t>
             </a:r>
-            <a:endParaRPr lang="" altLang="en-US"/>
+            <a:endParaRPr lang="en-US" altLang="en-US"/>
           </a:p>
         </p:txBody>
       </p:sp>
@@ -5096,33 +5114,33 @@
           <a:bodyPr/>
           <a:p>
             <a:r>
-              <a:rPr lang="" altLang="en-US"/>
+              <a:rPr lang="en-US" altLang="en-US"/>
               <a:t>The basic “move” of Bayesian statistics is to say that we should think of probability as a measure of </a:t>
             </a:r>
             <a:r>
-              <a:rPr lang="" altLang="en-US" b="1"/>
+              <a:rPr lang="en-US" altLang="en-US" b="1"/>
               <a:t>degree of belief </a:t>
             </a:r>
             <a:r>
-              <a:rPr lang="" altLang="en-US"/>
+              <a:rPr lang="en-US" altLang="en-US"/>
               <a:t>that we can apply to parameters and hypotheses</a:t>
             </a:r>
-            <a:endParaRPr lang="" altLang="en-US"/>
-          </a:p>
-          <a:p>
-            <a:r>
-              <a:rPr lang="" altLang="en-US"/>
+            <a:endParaRPr lang="en-US" altLang="en-US"/>
+          </a:p>
+          <a:p>
+            <a:r>
+              <a:rPr lang="en-US" altLang="en-US"/>
               <a:t>(Instead of the frequentist interpretation as </a:t>
             </a:r>
             <a:r>
-              <a:rPr lang="" altLang="en-US" b="1"/>
+              <a:rPr lang="en-US" altLang="en-US" b="1"/>
               <a:t>long-run frequency</a:t>
             </a:r>
             <a:r>
-              <a:rPr lang="" altLang="en-US"/>
+              <a:rPr lang="en-US" altLang="en-US"/>
               <a:t> of repeatable events)</a:t>
             </a:r>
-            <a:endParaRPr lang="" altLang="en-US"/>
+            <a:endParaRPr lang="en-US" altLang="en-US"/>
           </a:p>
         </p:txBody>
       </p:sp>
@@ -5180,10 +5198,10 @@
           <a:bodyPr/>
           <a:p>
             <a:r>
-              <a:rPr lang="" altLang="en-US"/>
+              <a:rPr lang="en-US" altLang="en-US"/>
               <a:t>Bayesian probability</a:t>
             </a:r>
-            <a:endParaRPr lang="" altLang="en-US"/>
+            <a:endParaRPr lang="en-US" altLang="en-US"/>
           </a:p>
         </p:txBody>
       </p:sp>
@@ -5202,43 +5220,43 @@
           <a:bodyPr/>
           <a:p>
             <a:r>
-              <a:rPr lang="" altLang="en-US" sz="2400"/>
+              <a:rPr lang="en-US" altLang="en-US" sz="2400"/>
               <a:t>Bayesian statistics “reads” the axiom of conditional probability differently:</a:t>
             </a:r>
-            <a:endParaRPr lang="" altLang="en-US" sz="2400"/>
-          </a:p>
-          <a:p>
-            <a:endParaRPr lang="" altLang="en-US" sz="2400"/>
+            <a:endParaRPr lang="en-US" altLang="en-US" sz="2400"/>
+          </a:p>
+          <a:p>
+            <a:endParaRPr lang="en-US" altLang="en-US" sz="2400"/>
           </a:p>
           <a:p>
             <a:pPr marL="0" indent="0">
               <a:buNone/>
             </a:pPr>
             <a:r>
-              <a:rPr lang="" altLang="en-US"/>
+              <a:rPr lang="en-US" altLang="en-US"/>
               <a:t> p(H | D)   =    p(D | H)   p(H)      /       p(D)</a:t>
             </a:r>
-            <a:endParaRPr lang="" altLang="en-US" sz="2285"/>
+            <a:endParaRPr lang="en-US" altLang="en-US" sz="2285"/>
           </a:p>
           <a:p>
             <a:pPr lvl="0"/>
-            <a:endParaRPr lang="" altLang="en-US" sz="2285"/>
+            <a:endParaRPr lang="en-US" altLang="en-US" sz="2285"/>
           </a:p>
           <a:p>
             <a:pPr lvl="0"/>
-            <a:endParaRPr lang="" altLang="en-US" sz="2285"/>
+            <a:endParaRPr lang="en-US" altLang="en-US" sz="2285"/>
           </a:p>
           <a:p>
             <a:pPr lvl="0"/>
-            <a:endParaRPr lang="" altLang="en-US" sz="2285"/>
+            <a:endParaRPr lang="en-US" altLang="en-US" sz="2285"/>
           </a:p>
           <a:p>
             <a:pPr lvl="0"/>
-            <a:endParaRPr lang="" altLang="en-US" sz="2285"/>
+            <a:endParaRPr lang="en-US" altLang="en-US" sz="2285"/>
           </a:p>
           <a:p>
             <a:pPr lvl="0"/>
-            <a:endParaRPr lang="" altLang="en-US" sz="2400"/>
+            <a:endParaRPr lang="en-US" altLang="en-US" sz="2400"/>
           </a:p>
         </p:txBody>
       </p:sp>
@@ -5285,24 +5303,24 @@
           </a:bodyPr>
           <a:p>
             <a:r>
-              <a:rPr lang="" altLang="en-US"/>
+              <a:rPr lang="en-US" altLang="en-US"/>
               <a:t>updated</a:t>
             </a:r>
-            <a:endParaRPr lang="" altLang="en-US"/>
-          </a:p>
-          <a:p>
-            <a:r>
-              <a:rPr lang="" altLang="en-US"/>
+            <a:endParaRPr lang="en-US" altLang="en-US"/>
+          </a:p>
+          <a:p>
+            <a:r>
+              <a:rPr lang="en-US" altLang="en-US"/>
               <a:t>(posterior)</a:t>
             </a:r>
-            <a:endParaRPr lang="" altLang="en-US"/>
-          </a:p>
-          <a:p>
-            <a:r>
-              <a:rPr lang="" altLang="en-US"/>
+            <a:endParaRPr lang="en-US" altLang="en-US"/>
+          </a:p>
+          <a:p>
+            <a:r>
+              <a:rPr lang="en-US" altLang="en-US"/>
               <a:t>belief in H</a:t>
             </a:r>
-            <a:endParaRPr lang="" altLang="en-US"/>
+            <a:endParaRPr lang="en-US" altLang="en-US"/>
           </a:p>
         </p:txBody>
       </p:sp>
@@ -5328,24 +5346,24 @@
           </a:bodyPr>
           <a:p>
             <a:r>
-              <a:rPr lang="" altLang="en-US"/>
+              <a:rPr lang="en-US" altLang="en-US"/>
               <a:t>how well</a:t>
             </a:r>
-            <a:endParaRPr lang="" altLang="en-US"/>
-          </a:p>
-          <a:p>
-            <a:r>
-              <a:rPr lang="" altLang="en-US"/>
+            <a:endParaRPr lang="en-US" altLang="en-US"/>
+          </a:p>
+          <a:p>
+            <a:r>
+              <a:rPr lang="en-US" altLang="en-US"/>
               <a:t>H predicts</a:t>
             </a:r>
-            <a:endParaRPr lang="" altLang="en-US"/>
-          </a:p>
-          <a:p>
-            <a:r>
-              <a:rPr lang="" altLang="en-US"/>
+            <a:endParaRPr lang="en-US" altLang="en-US"/>
+          </a:p>
+          <a:p>
+            <a:r>
+              <a:rPr lang="en-US" altLang="en-US"/>
               <a:t>data D</a:t>
             </a:r>
-            <a:endParaRPr lang="" altLang="en-US"/>
+            <a:endParaRPr lang="en-US" altLang="en-US"/>
           </a:p>
         </p:txBody>
       </p:sp>
@@ -5371,24 +5389,24 @@
           </a:bodyPr>
           <a:p>
             <a:r>
-              <a:rPr lang="" altLang="en-US"/>
+              <a:rPr lang="en-US" altLang="en-US"/>
               <a:t>times our</a:t>
             </a:r>
-            <a:endParaRPr lang="" altLang="en-US"/>
-          </a:p>
-          <a:p>
-            <a:r>
-              <a:rPr lang="" altLang="en-US"/>
+            <a:endParaRPr lang="en-US" altLang="en-US"/>
+          </a:p>
+          <a:p>
+            <a:r>
+              <a:rPr lang="en-US" altLang="en-US"/>
               <a:t>prior belief</a:t>
             </a:r>
-            <a:endParaRPr lang="" altLang="en-US"/>
-          </a:p>
-          <a:p>
-            <a:r>
-              <a:rPr lang="" altLang="en-US"/>
+            <a:endParaRPr lang="en-US" altLang="en-US"/>
+          </a:p>
+          <a:p>
+            <a:r>
+              <a:rPr lang="en-US" altLang="en-US"/>
               <a:t>in H</a:t>
             </a:r>
-            <a:endParaRPr lang="" altLang="en-US"/>
+            <a:endParaRPr lang="en-US" altLang="en-US"/>
           </a:p>
         </p:txBody>
       </p:sp>
@@ -5414,31 +5432,31 @@
           </a:bodyPr>
           <a:p>
             <a:r>
-              <a:rPr lang="" altLang="en-US"/>
+              <a:rPr lang="en-US" altLang="en-US"/>
               <a:t>normalized</a:t>
             </a:r>
-            <a:endParaRPr lang="" altLang="en-US"/>
-          </a:p>
-          <a:p>
-            <a:r>
-              <a:rPr lang="" altLang="en-US"/>
+            <a:endParaRPr lang="en-US" altLang="en-US"/>
+          </a:p>
+          <a:p>
+            <a:r>
+              <a:rPr lang="en-US" altLang="en-US"/>
               <a:t>by how</a:t>
             </a:r>
-            <a:endParaRPr lang="" altLang="en-US"/>
-          </a:p>
-          <a:p>
-            <a:r>
-              <a:rPr lang="" altLang="en-US"/>
+            <a:endParaRPr lang="en-US" altLang="en-US"/>
+          </a:p>
+          <a:p>
+            <a:r>
+              <a:rPr lang="en-US" altLang="en-US"/>
               <a:t>likely the data</a:t>
             </a:r>
-            <a:endParaRPr lang="" altLang="en-US"/>
-          </a:p>
-          <a:p>
-            <a:r>
-              <a:rPr lang="" altLang="en-US"/>
+            <a:endParaRPr lang="en-US" altLang="en-US"/>
+          </a:p>
+          <a:p>
+            <a:r>
+              <a:rPr lang="en-US" altLang="en-US"/>
               <a:t>was overall</a:t>
             </a:r>
-            <a:endParaRPr lang="" altLang="en-US"/>
+            <a:endParaRPr lang="en-US" altLang="en-US"/>
           </a:p>
         </p:txBody>
       </p:sp>
@@ -5480,18 +5498,18 @@
           <a:bodyPr/>
           <a:p>
             <a:r>
-              <a:rPr lang="" altLang="en-US"/>
+              <a:rPr lang="en-US" altLang="en-US"/>
               <a:t>The </a:t>
             </a:r>
             <a:r>
-              <a:rPr lang="" altLang="en-US" i="1"/>
+              <a:rPr lang="en-US" altLang="en-US" i="1"/>
               <a:t>t </a:t>
             </a:r>
             <a:r>
-              <a:rPr lang="" altLang="en-US"/>
+              <a:rPr lang="en-US" altLang="en-US"/>
               <a:t>test (again (again))</a:t>
             </a:r>
-            <a:endParaRPr lang="" altLang="en-US"/>
+            <a:endParaRPr lang="en-US" altLang="en-US"/>
           </a:p>
         </p:txBody>
       </p:sp>
@@ -5510,53 +5528,53 @@
           <a:bodyPr/>
           <a:p>
             <a:r>
-              <a:rPr lang="" altLang="en-US"/>
+              <a:rPr lang="en-US" altLang="en-US"/>
               <a:t>A “Bayesian t-test” goes straight for the jugular: what is p(mean | data)?</a:t>
             </a:r>
-            <a:endParaRPr lang="" altLang="en-US"/>
+            <a:endParaRPr lang="en-US" altLang="en-US"/>
           </a:p>
           <a:p>
             <a:pPr lvl="1"/>
             <a:r>
-              <a:rPr lang="" altLang="en-US"/>
+              <a:rPr lang="en-US" altLang="en-US"/>
               <a:t>Note: “mean” is the </a:t>
             </a:r>
             <a:r>
-              <a:rPr lang="" altLang="en-US" b="1"/>
+              <a:rPr lang="en-US" altLang="en-US" b="1"/>
               <a:t>parameter</a:t>
             </a:r>
             <a:r>
-              <a:rPr lang="" altLang="en-US"/>
+              <a:rPr lang="en-US" altLang="en-US"/>
               <a:t>.  When we write p(mean | data), that’s shorthand for p(mean=x | data), which is a function of they hypothetical value </a:t>
             </a:r>
             <a:r>
-              <a:rPr lang="" altLang="en-US" i="1"/>
+              <a:rPr lang="en-US" altLang="en-US" i="1"/>
               <a:t>mean=x</a:t>
             </a:r>
-            <a:endParaRPr lang="" altLang="en-US" i="1"/>
+            <a:endParaRPr lang="en-US" altLang="en-US" i="1"/>
           </a:p>
           <a:p>
             <a:pPr lvl="0"/>
             <a:r>
-              <a:rPr lang="" altLang="en-US"/>
+              <a:rPr lang="en-US" altLang="en-US"/>
               <a:t>Apply Bayes rule:</a:t>
             </a:r>
-            <a:endParaRPr lang="" altLang="en-US"/>
+            <a:endParaRPr lang="en-US" altLang="en-US"/>
           </a:p>
           <a:p>
             <a:pPr lvl="1"/>
             <a:r>
-              <a:rPr lang="" altLang="en-US"/>
+              <a:rPr lang="en-US" altLang="en-US"/>
               <a:t>p(mean | data) = p(data | mean) p(mean) /                     </a:t>
             </a:r>
             <a:br>
-              <a:rPr lang="" altLang="en-US"/>
+              <a:rPr lang="en-US" altLang="en-US"/>
             </a:br>
             <a:r>
-              <a:rPr lang="" altLang="en-US"/>
+              <a:rPr lang="en-US" altLang="en-US"/>
               <a:t>                                          p(data)</a:t>
             </a:r>
-            <a:endParaRPr lang="" altLang="en-US"/>
+            <a:endParaRPr lang="en-US" altLang="en-US"/>
           </a:p>
         </p:txBody>
       </p:sp>
@@ -5649,7 +5667,48 @@
         <p:txBody>
           <a:bodyPr/>
           <a:p>
-            <a:endParaRPr lang="en-US"/>
+            <a:r>
+              <a:rPr lang="en-US" altLang="en-US"/>
+              <a:t>We want to </a:t>
+            </a:r>
+            <a:r>
+              <a:rPr lang="en-US" altLang="en-US" b="1"/>
+              <a:t>infer</a:t>
+            </a:r>
+            <a:r>
+              <a:rPr lang="en-US" altLang="en-US"/>
+              <a:t> the mean of the data-generating process</a:t>
+            </a:r>
+            <a:endParaRPr lang="en-US" altLang="en-US"/>
+          </a:p>
+          <a:p>
+            <a:r>
+              <a:rPr lang="en-US" altLang="en-US"/>
+              <a:t>What is this process? Specified via </a:t>
+            </a:r>
+            <a:r>
+              <a:rPr lang="en-US" altLang="en-US" b="1"/>
+              <a:t>generative model</a:t>
+            </a:r>
+            <a:endParaRPr lang="en-US" altLang="en-US" b="1"/>
+          </a:p>
+          <a:p>
+            <a:r>
+              <a:rPr lang="en-US" altLang="en-US"/>
+              <a:t>The generative model is your data's </a:t>
+            </a:r>
+            <a:r>
+              <a:rPr lang="en-US" altLang="en-US" b="1"/>
+              <a:t>origin story</a:t>
+            </a:r>
+            <a:endParaRPr lang="en-US" altLang="en-US"/>
+          </a:p>
+          <a:p>
+            <a:r>
+              <a:rPr lang="en-US" altLang="en-US"/>
+              <a:t>Two parts: prior and likelihood</a:t>
+            </a:r>
+            <a:endParaRPr lang="en-US" altLang="en-US"/>
           </a:p>
         </p:txBody>
       </p:sp>
@@ -5706,7 +5765,11 @@
         <p:txBody>
           <a:bodyPr/>
           <a:p>
-            <a:endParaRPr lang="en-US"/>
+            <a:r>
+              <a:rPr lang="en-US" altLang="en-US"/>
+              <a:t>Likelihood: p(D | H)</a:t>
+            </a:r>
+            <a:endParaRPr lang="en-US" altLang="en-US"/>
           </a:p>
         </p:txBody>
       </p:sp>
@@ -5720,11 +5783,65 @@
             <p:ph idx="1"/>
           </p:nvPr>
         </p:nvSpPr>
-        <p:spPr/>
+        <p:spPr>
+          <a:xfrm>
+            <a:off x="685800" y="1981200"/>
+            <a:ext cx="7939405" cy="4114800"/>
+          </a:xfrm>
+        </p:spPr>
         <p:txBody>
           <a:bodyPr/>
           <a:p>
-            <a:endParaRPr lang="en-US"/>
+            <a:r>
+              <a:rPr lang="en-US" altLang="en-US"/>
+              <a:t>Given values of our parameters, how did our data come about?</a:t>
+            </a:r>
+            <a:endParaRPr lang="en-US" altLang="en-US"/>
+          </a:p>
+          <a:p>
+            <a:r>
+              <a:rPr lang="en-US" altLang="en-US"/>
+              <a:t>For the </a:t>
+            </a:r>
+            <a:r>
+              <a:rPr lang="en-US" altLang="en-US" i="1"/>
+              <a:t>t </a:t>
+            </a:r>
+            <a:r>
+              <a:rPr lang="en-US" altLang="en-US"/>
+              <a:t>test, the parameters are a </a:t>
+            </a:r>
+            <a:r>
+              <a:rPr lang="en-US" altLang="en-US" b="1"/>
+              <a:t>mean</a:t>
+            </a:r>
+            <a:r>
+              <a:rPr lang="en-US" altLang="en-US"/>
+              <a:t> and a </a:t>
+            </a:r>
+            <a:r>
+              <a:rPr lang="en-US" altLang="en-US" b="1"/>
+              <a:t>variance</a:t>
+            </a:r>
+            <a:endParaRPr lang="en-US" altLang="en-US"/>
+          </a:p>
+          <a:p>
+            <a:r>
+              <a:rPr lang="en-US" altLang="en-US"/>
+              <a:t>Given mean and variance, the data points are drawn from a Normal distribution.</a:t>
+            </a:r>
+            <a:endParaRPr lang="en-US" altLang="en-US"/>
+          </a:p>
+          <a:p>
+            <a:r>
+              <a:rPr lang="en-US" altLang="en-US"/>
+              <a:t>These are </a:t>
+            </a:r>
+            <a:r>
+              <a:rPr lang="en-US" altLang="en-US" b="1"/>
+              <a:t>assumptions of the model!!</a:t>
+            </a:r>
+            <a:endParaRPr lang="en-US" altLang="en-US" b="1"/>
           </a:p>
         </p:txBody>
       </p:sp>
@@ -5781,7 +5898,11 @@
         <p:txBody>
           <a:bodyPr/>
           <a:p>
-            <a:endParaRPr lang="en-US"/>
+            <a:r>
+              <a:rPr lang="en-US" altLang="en-US"/>
+              <a:t>Prior p(H)</a:t>
+            </a:r>
+            <a:endParaRPr lang="en-US" altLang="en-US"/>
           </a:p>
         </p:txBody>
       </p:sp>
@@ -5799,7 +5920,22 @@
         <p:txBody>
           <a:bodyPr/>
           <a:p>
-            <a:endParaRPr lang="en-US"/>
+            <a:r>
+              <a:rPr lang="en-US" altLang="en-US"/>
+              <a:t>Where did the </a:t>
+            </a:r>
+            <a:r>
+              <a:rPr lang="en-US" altLang="en-US" b="1"/>
+              <a:t>parameters</a:t>
+            </a:r>
+            <a:r>
+              <a:rPr lang="en-US" altLang="en-US"/>
+              <a:t> come from?</a:t>
+            </a:r>
+            <a:endParaRPr lang="en-US" altLang="en-US"/>
+          </a:p>
+          <a:p>
+            <a:endParaRPr lang="en-US" altLang="en-US"/>
           </a:p>
         </p:txBody>
       </p:sp>
@@ -5821,6 +5957,88 @@
               <a:rPr lang="en-US"/>
             </a:fld>
             <a:endParaRPr lang="en-US"/>
+          </a:p>
+        </p:txBody>
+      </p:sp>
+      <p:pic>
+        <p:nvPicPr>
+          <p:cNvPr id="5" name="Picture 4" descr="_Adam_s_Creation_Sistine_Chapel_ceiling__by_Michelangelo_JBU33cut.0"/>
+          <p:cNvPicPr>
+            <a:picLocks noChangeAspect="1"/>
+          </p:cNvPicPr>
+          <p:nvPr/>
+        </p:nvPicPr>
+        <p:blipFill>
+          <a:blip r:embed="rId1"/>
+          <a:stretch>
+            <a:fillRect/>
+          </a:stretch>
+        </p:blipFill>
+        <p:spPr>
+          <a:xfrm>
+            <a:off x="-141605" y="-44450"/>
+            <a:ext cx="10419715" cy="6946265"/>
+          </a:xfrm>
+          <a:prstGeom prst="rect">
+            <a:avLst/>
+          </a:prstGeom>
+        </p:spPr>
+      </p:pic>
+      <p:sp>
+        <p:nvSpPr>
+          <p:cNvPr id="10" name="&quot;No&quot; Symbol 9"/>
+          <p:cNvSpPr/>
+          <p:nvPr/>
+        </p:nvSpPr>
+        <p:spPr>
+          <a:xfrm>
+            <a:off x="1905000" y="685800"/>
+            <a:ext cx="5334000" cy="5334000"/>
+          </a:xfrm>
+          <a:prstGeom prst="noSmoking">
+            <a:avLst/>
+          </a:prstGeom>
+          <a:solidFill>
+            <a:srgbClr val="FF0000"/>
+          </a:solidFill>
+          <a:ln w="9525" cap="flat" cmpd="sng" algn="ctr">
+            <a:noFill/>
+            <a:prstDash val="solid"/>
+            <a:round/>
+            <a:headEnd type="none" w="med" len="med"/>
+            <a:tailEnd type="none" w="med" len="med"/>
+          </a:ln>
+        </p:spPr>
+        <p:txBody>
+          <a:bodyPr vert="horz" wrap="square" lIns="91440" tIns="45720" rIns="91440" bIns="45720" numCol="1" anchor="t" anchorCtr="0" compatLnSpc="1"/>
+          <a:p>
+            <a:pPr marL="0" marR="0" indent="0" algn="l" defTabSz="914400" rtl="0" eaLnBrk="0" fontAlgn="base" latinLnBrk="0" hangingPunct="0">
+              <a:lnSpc>
+                <a:spcPct val="100000"/>
+              </a:lnSpc>
+              <a:spcBef>
+                <a:spcPct val="0"/>
+              </a:spcBef>
+              <a:spcAft>
+                <a:spcPct val="0"/>
+              </a:spcAft>
+              <a:buClrTx/>
+              <a:buSzTx/>
+              <a:buFontTx/>
+              <a:buNone/>
+            </a:pPr>
+            <a:endParaRPr kumimoji="0" lang="en-US" sz="2400" b="0" i="0" u="none" strike="noStrike" cap="none" normalizeH="0" baseline="0">
+              <a:ln>
+                <a:noFill/>
+              </a:ln>
+              <a:solidFill>
+                <a:schemeClr val="tx1"/>
+              </a:solidFill>
+              <a:effectLst/>
+              <a:latin typeface="Arimo" panose="020B0604020202020204" pitchFamily="34" charset="0"/>
+              <a:ea typeface="MS PGothic" pitchFamily="124" charset="-128"/>
+              <a:cs typeface="MS PGothic" pitchFamily="124" charset="-128"/>
+            </a:endParaRPr>
           </a:p>
         </p:txBody>
       </p:sp>
@@ -5829,6 +6047,120 @@
   <p:clrMapOvr>
     <a:masterClrMapping/>
   </p:clrMapOvr>
+  <p:timing>
+    <p:tnLst>
+      <p:par>
+        <p:cTn id="1" dur="indefinite" restart="never" nodeType="tmRoot">
+          <p:childTnLst>
+            <p:seq concurrent="1" nextAc="seek">
+              <p:cTn id="2" dur="indefinite" nodeType="mainSeq">
+                <p:childTnLst>
+                  <p:par>
+                    <p:cTn id="3" fill="hold">
+                      <p:stCondLst>
+                        <p:cond delay="indefinite"/>
+                      </p:stCondLst>
+                      <p:childTnLst>
+                        <p:par>
+                          <p:cTn id="4" fill="hold">
+                            <p:stCondLst>
+                              <p:cond delay="0"/>
+                            </p:stCondLst>
+                            <p:childTnLst>
+                              <p:par>
+                                <p:cTn id="5" presetID="1" presetClass="entr" presetSubtype="0" fill="hold" nodeType="clickEffect">
+                                  <p:stCondLst>
+                                    <p:cond delay="0"/>
+                                  </p:stCondLst>
+                                  <p:childTnLst>
+                                    <p:set>
+                                      <p:cBhvr>
+                                        <p:cTn id="6" dur="1" fill="hold">
+                                          <p:stCondLst>
+                                            <p:cond delay="0"/>
+                                          </p:stCondLst>
+                                        </p:cTn>
+                                        <p:tgtEl>
+                                          <p:spTgt spid="5"/>
+                                        </p:tgtEl>
+                                        <p:attrNameLst>
+                                          <p:attrName>style.visibility</p:attrName>
+                                        </p:attrNameLst>
+                                      </p:cBhvr>
+                                      <p:to>
+                                        <p:strVal val="visible"/>
+                                      </p:to>
+                                    </p:set>
+                                  </p:childTnLst>
+                                </p:cTn>
+                              </p:par>
+                            </p:childTnLst>
+                          </p:cTn>
+                        </p:par>
+                        <p:par>
+                          <p:cTn id="7" fill="hold">
+                            <p:stCondLst>
+                              <p:cond delay="0"/>
+                            </p:stCondLst>
+                            <p:childTnLst>
+                              <p:par>
+                                <p:cTn id="8" presetID="1" presetClass="entr" presetSubtype="0" fill="hold" grpId="1" nodeType="afterEffect">
+                                  <p:stCondLst>
+                                    <p:cond delay="500"/>
+                                  </p:stCondLst>
+                                  <p:childTnLst>
+                                    <p:set>
+                                      <p:cBhvr>
+                                        <p:cTn id="9" dur="1" fill="hold">
+                                          <p:stCondLst>
+                                            <p:cond delay="0"/>
+                                          </p:stCondLst>
+                                        </p:cTn>
+                                        <p:tgtEl>
+                                          <p:spTgt spid="10"/>
+                                        </p:tgtEl>
+                                        <p:attrNameLst>
+                                          <p:attrName>style.visibility</p:attrName>
+                                        </p:attrNameLst>
+                                      </p:cBhvr>
+                                      <p:to>
+                                        <p:strVal val="visible"/>
+                                      </p:to>
+                                    </p:set>
+                                  </p:childTnLst>
+                                </p:cTn>
+                              </p:par>
+                            </p:childTnLst>
+                          </p:cTn>
+                        </p:par>
+                      </p:childTnLst>
+                    </p:cTn>
+                  </p:par>
+                </p:childTnLst>
+              </p:cTn>
+              <p:prevCondLst>
+                <p:cond evt="onPrev" delay="0">
+                  <p:tgtEl>
+                    <p:sldTgt/>
+                  </p:tgtEl>
+                </p:cond>
+              </p:prevCondLst>
+              <p:nextCondLst>
+                <p:cond evt="onNext" delay="0">
+                  <p:tgtEl>
+                    <p:sldTgt/>
+                  </p:tgtEl>
+                </p:cond>
+              </p:nextCondLst>
+            </p:seq>
+          </p:childTnLst>
+        </p:cTn>
+      </p:par>
+    </p:tnLst>
+    <p:bldLst>
+      <p:bldP spid="10" grpId="1" bldLvl="0" animBg="1"/>
+    </p:bldLst>
+  </p:timing>
 </p:sld>
 </file>
 
@@ -5857,10 +6189,10 @@
           <a:bodyPr/>
           <a:p>
             <a:r>
-              <a:rPr lang="" altLang="en-US"/>
+              <a:rPr lang="en-US" altLang="en-US"/>
               <a:t>The plan</a:t>
             </a:r>
-            <a:endParaRPr lang="" altLang="en-US"/>
+            <a:endParaRPr lang="en-US" altLang="en-US"/>
           </a:p>
         </p:txBody>
       </p:sp>
@@ -5879,36 +6211,36 @@
           <a:bodyPr/>
           <a:p>
             <a:r>
-              <a:rPr lang="" altLang="en-US"/>
+              <a:rPr lang="en-US" altLang="en-US"/>
               <a:t>Frequentist vs. Bayesian </a:t>
             </a:r>
             <a:r>
-              <a:rPr lang="" altLang="en-US" b="1"/>
+              <a:rPr lang="en-US" altLang="en-US" b="1"/>
               <a:t>probability</a:t>
             </a:r>
-            <a:endParaRPr lang="" altLang="en-US"/>
-          </a:p>
-          <a:p>
-            <a:r>
-              <a:rPr lang="" altLang="en-US" b="1"/>
+            <a:endParaRPr lang="en-US" altLang="en-US"/>
+          </a:p>
+          <a:p>
+            <a:r>
+              <a:rPr lang="en-US" altLang="en-US" b="1"/>
               <a:t>Generative </a:t>
             </a:r>
             <a:r>
-              <a:rPr lang="" altLang="en-US"/>
+              <a:rPr lang="en-US" altLang="en-US"/>
               <a:t>modeling</a:t>
             </a:r>
-            <a:endParaRPr lang="" altLang="en-US"/>
-          </a:p>
-          <a:p>
-            <a:r>
-              <a:rPr lang="" altLang="en-US"/>
+            <a:endParaRPr lang="en-US" altLang="en-US"/>
+          </a:p>
+          <a:p>
+            <a:r>
+              <a:rPr lang="en-US" altLang="en-US"/>
               <a:t>Working with </a:t>
             </a:r>
             <a:r>
-              <a:rPr lang="" altLang="en-US" b="1"/>
+              <a:rPr lang="en-US" altLang="en-US" b="1"/>
               <a:t>samples</a:t>
             </a:r>
-            <a:endParaRPr lang="" altLang="en-US" b="1"/>
+            <a:endParaRPr lang="en-US" altLang="en-US" b="1"/>
           </a:p>
         </p:txBody>
       </p:sp>
@@ -5942,6 +6274,641 @@
 </file>
 
 <file path=ppt/slides/slide20.xml><?xml version="1.0" encoding="utf-8"?>
+<p:sld xmlns:a="http://schemas.openxmlformats.org/drawingml/2006/main" xmlns:r="http://schemas.openxmlformats.org/officeDocument/2006/relationships" xmlns:p="http://schemas.openxmlformats.org/presentationml/2006/main">
+  <p:cSld>
+    <p:spTree>
+      <p:nvGrpSpPr>
+        <p:cNvPr id="1" name=""/>
+        <p:cNvGrpSpPr/>
+        <p:nvPr/>
+      </p:nvGrpSpPr>
+      <p:grpSpPr/>
+      <p:sp>
+        <p:nvSpPr>
+          <p:cNvPr id="2" name="Title 1"/>
+          <p:cNvSpPr>
+            <a:spLocks noGrp="1"/>
+          </p:cNvSpPr>
+          <p:nvPr>
+            <p:ph type="title"/>
+          </p:nvPr>
+        </p:nvSpPr>
+        <p:spPr/>
+        <p:txBody>
+          <a:bodyPr/>
+          <a:p>
+            <a:r>
+              <a:rPr lang="en-US" altLang="en-US"/>
+              <a:t>Prior: p(H)</a:t>
+            </a:r>
+            <a:endParaRPr lang="en-US" altLang="en-US"/>
+          </a:p>
+        </p:txBody>
+      </p:sp>
+      <p:sp>
+        <p:nvSpPr>
+          <p:cNvPr id="3" name="Content Placeholder 2"/>
+          <p:cNvSpPr>
+            <a:spLocks noGrp="1"/>
+          </p:cNvSpPr>
+          <p:nvPr>
+            <p:ph idx="1"/>
+          </p:nvPr>
+        </p:nvSpPr>
+        <p:spPr/>
+        <p:txBody>
+          <a:bodyPr/>
+          <a:p>
+            <a:r>
+              <a:rPr lang="en-US" altLang="en-US"/>
+              <a:t>Where did the </a:t>
+            </a:r>
+            <a:r>
+              <a:rPr lang="en-US" altLang="en-US" b="1"/>
+              <a:t>parameters</a:t>
+            </a:r>
+            <a:r>
+              <a:rPr lang="en-US" altLang="en-US"/>
+              <a:t> come from?</a:t>
+            </a:r>
+            <a:endParaRPr lang="en-US" altLang="en-US"/>
+          </a:p>
+          <a:p>
+            <a:r>
+              <a:rPr lang="en-US" altLang="en-US"/>
+              <a:t>We need a story for this</a:t>
+            </a:r>
+            <a:r>
+              <a:rPr lang="" altLang="en-US"/>
+              <a:t>, which captures our </a:t>
+            </a:r>
+            <a:r>
+              <a:rPr lang="" altLang="en-US" b="1"/>
+              <a:t>uncertain beliefs</a:t>
+            </a:r>
+            <a:r>
+              <a:rPr lang="" altLang="en-US"/>
+              <a:t> about these parameters before observing any data</a:t>
+            </a:r>
+            <a:endParaRPr lang="" altLang="en-US"/>
+          </a:p>
+          <a:p>
+            <a:r>
+              <a:rPr lang="" altLang="en-US"/>
+              <a:t>In practice, this doesn't matter as much as the likelihood, since the data tend to overwhelm the prior </a:t>
+            </a:r>
+            <a:r>
+              <a:rPr lang="" altLang="en-US" b="1"/>
+              <a:t>most</a:t>
+            </a:r>
+            <a:r>
+              <a:rPr lang="" altLang="en-US"/>
+              <a:t> of the time</a:t>
+            </a:r>
+            <a:endParaRPr lang="en-US" altLang="en-US"/>
+          </a:p>
+          <a:p>
+            <a:endParaRPr lang="en-US" altLang="en-US"/>
+          </a:p>
+        </p:txBody>
+      </p:sp>
+      <p:sp>
+        <p:nvSpPr>
+          <p:cNvPr id="4" name="Slide Number Placeholder 3"/>
+          <p:cNvSpPr>
+            <a:spLocks noGrp="1"/>
+          </p:cNvSpPr>
+          <p:nvPr>
+            <p:ph type="sldNum" sz="quarter" idx="12"/>
+          </p:nvPr>
+        </p:nvSpPr>
+        <p:spPr/>
+        <p:txBody>
+          <a:bodyPr/>
+          <a:p>
+            <a:fld id="{5F80C8D4-EBF1-459B-B948-4CDFA6C62824}" type="slidenum">
+              <a:rPr lang="en-US"/>
+            </a:fld>
+            <a:endParaRPr lang="en-US"/>
+          </a:p>
+        </p:txBody>
+      </p:sp>
+    </p:spTree>
+  </p:cSld>
+  <p:clrMapOvr>
+    <a:masterClrMapping/>
+  </p:clrMapOvr>
+  <p:timing>
+    <p:tnLst>
+      <p:par>
+        <p:cTn id="1" dur="indefinite" restart="never" nodeType="tmRoot"/>
+      </p:par>
+    </p:tnLst>
+  </p:timing>
+</p:sld>
+</file>
+
+<file path=ppt/slides/slide21.xml><?xml version="1.0" encoding="utf-8"?>
+<p:sld xmlns:a="http://schemas.openxmlformats.org/drawingml/2006/main" xmlns:r="http://schemas.openxmlformats.org/officeDocument/2006/relationships" xmlns:p="http://schemas.openxmlformats.org/presentationml/2006/main">
+  <p:cSld>
+    <p:spTree>
+      <p:nvGrpSpPr>
+        <p:cNvPr id="1" name=""/>
+        <p:cNvGrpSpPr/>
+        <p:nvPr/>
+      </p:nvGrpSpPr>
+      <p:grpSpPr/>
+      <p:sp>
+        <p:nvSpPr>
+          <p:cNvPr id="2" name="Title 1"/>
+          <p:cNvSpPr>
+            <a:spLocks noGrp="1"/>
+          </p:cNvSpPr>
+          <p:nvPr>
+            <p:ph type="title"/>
+          </p:nvPr>
+        </p:nvSpPr>
+        <p:spPr/>
+        <p:txBody>
+          <a:bodyPr/>
+          <a:p>
+            <a:r>
+              <a:rPr lang="" altLang="en-US"/>
+              <a:t>Prior: p(H)</a:t>
+            </a:r>
+            <a:endParaRPr lang="" altLang="en-US"/>
+          </a:p>
+        </p:txBody>
+      </p:sp>
+      <p:sp>
+        <p:nvSpPr>
+          <p:cNvPr id="3" name="Content Placeholder 2"/>
+          <p:cNvSpPr>
+            <a:spLocks noGrp="1"/>
+          </p:cNvSpPr>
+          <p:nvPr>
+            <p:ph idx="1"/>
+          </p:nvPr>
+        </p:nvSpPr>
+        <p:spPr/>
+        <p:txBody>
+          <a:bodyPr/>
+          <a:p>
+            <a:r>
+              <a:rPr lang="" altLang="en-US"/>
+              <a:t>A convenient choice when we have Normally distributed data:</a:t>
+            </a:r>
+            <a:endParaRPr lang="" altLang="en-US"/>
+          </a:p>
+          <a:p>
+            <a:pPr lvl="1"/>
+            <a:r>
+              <a:rPr lang="" altLang="en-US"/>
+              <a:t>Variance is drawn from an “Inverse Chi-squared” distribution</a:t>
+            </a:r>
+            <a:endParaRPr lang="" altLang="en-US"/>
+          </a:p>
+          <a:p>
+            <a:pPr lvl="1"/>
+            <a:r>
+              <a:rPr lang="" altLang="en-US"/>
+              <a:t>Mean from a Normal distribution itself.</a:t>
+            </a:r>
+            <a:endParaRPr lang="" altLang="en-US"/>
+          </a:p>
+          <a:p>
+            <a:pPr lvl="0"/>
+            <a:r>
+              <a:rPr lang="" altLang="en-US"/>
+              <a:t>We have to pick the parameters of THESE distributions too!</a:t>
+            </a:r>
+            <a:endParaRPr lang="" altLang="en-US"/>
+          </a:p>
+          <a:p>
+            <a:pPr lvl="1"/>
+            <a:r>
+              <a:rPr lang="" altLang="en-US"/>
+              <a:t>What is a reasonable prior guess for the mean? Zero?  How confident are we?</a:t>
+            </a:r>
+            <a:endParaRPr lang="" altLang="en-US"/>
+          </a:p>
+        </p:txBody>
+      </p:sp>
+      <p:sp>
+        <p:nvSpPr>
+          <p:cNvPr id="4" name="Slide Number Placeholder 3"/>
+          <p:cNvSpPr>
+            <a:spLocks noGrp="1"/>
+          </p:cNvSpPr>
+          <p:nvPr>
+            <p:ph type="sldNum" sz="quarter" idx="12"/>
+          </p:nvPr>
+        </p:nvSpPr>
+        <p:spPr/>
+        <p:txBody>
+          <a:bodyPr/>
+          <a:p>
+            <a:fld id="{5F80C8D4-EBF1-459B-B948-4CDFA6C62824}" type="slidenum">
+              <a:rPr lang="en-US"/>
+            </a:fld>
+            <a:endParaRPr lang="en-US"/>
+          </a:p>
+        </p:txBody>
+      </p:sp>
+    </p:spTree>
+  </p:cSld>
+  <p:clrMapOvr>
+    <a:masterClrMapping/>
+  </p:clrMapOvr>
+</p:sld>
+</file>
+
+<file path=ppt/slides/slide22.xml><?xml version="1.0" encoding="utf-8"?>
+<p:sld xmlns:a="http://schemas.openxmlformats.org/drawingml/2006/main" xmlns:r="http://schemas.openxmlformats.org/officeDocument/2006/relationships" xmlns:p="http://schemas.openxmlformats.org/presentationml/2006/main">
+  <p:cSld>
+    <p:spTree>
+      <p:nvGrpSpPr>
+        <p:cNvPr id="1" name=""/>
+        <p:cNvGrpSpPr/>
+        <p:nvPr/>
+      </p:nvGrpSpPr>
+      <p:grpSpPr/>
+      <p:sp>
+        <p:nvSpPr>
+          <p:cNvPr id="2" name="Title 1"/>
+          <p:cNvSpPr>
+            <a:spLocks noGrp="1"/>
+          </p:cNvSpPr>
+          <p:nvPr>
+            <p:ph type="title"/>
+          </p:nvPr>
+        </p:nvSpPr>
+        <p:spPr/>
+        <p:txBody>
+          <a:bodyPr/>
+          <a:p>
+            <a:r>
+              <a:rPr lang="" altLang="en-US"/>
+              <a:t>Posterior: p(H | D)</a:t>
+            </a:r>
+            <a:endParaRPr lang="" altLang="en-US"/>
+          </a:p>
+        </p:txBody>
+      </p:sp>
+      <p:sp>
+        <p:nvSpPr>
+          <p:cNvPr id="3" name="Content Placeholder 2"/>
+          <p:cNvSpPr>
+            <a:spLocks noGrp="1"/>
+          </p:cNvSpPr>
+          <p:nvPr>
+            <p:ph idx="1"/>
+          </p:nvPr>
+        </p:nvSpPr>
+        <p:spPr/>
+        <p:txBody>
+          <a:bodyPr/>
+          <a:p>
+            <a:r>
+              <a:rPr lang="" altLang="en-US"/>
+              <a:t>Now we can combine prior and likelihood, given some data, using Bayes rule!</a:t>
+            </a:r>
+            <a:endParaRPr lang="" altLang="en-US"/>
+          </a:p>
+        </p:txBody>
+      </p:sp>
+      <p:sp>
+        <p:nvSpPr>
+          <p:cNvPr id="4" name="Slide Number Placeholder 3"/>
+          <p:cNvSpPr>
+            <a:spLocks noGrp="1"/>
+          </p:cNvSpPr>
+          <p:nvPr>
+            <p:ph type="sldNum" sz="quarter" idx="12"/>
+          </p:nvPr>
+        </p:nvSpPr>
+        <p:spPr/>
+        <p:txBody>
+          <a:bodyPr/>
+          <a:p>
+            <a:fld id="{5F80C8D4-EBF1-459B-B948-4CDFA6C62824}" type="slidenum">
+              <a:rPr lang="en-US"/>
+            </a:fld>
+            <a:endParaRPr lang="en-US"/>
+          </a:p>
+        </p:txBody>
+      </p:sp>
+      <p:pic>
+        <p:nvPicPr>
+          <p:cNvPr id="5" name="Picture 4"/>
+          <p:cNvPicPr>
+            <a:picLocks noChangeAspect="1"/>
+          </p:cNvPicPr>
+          <p:nvPr/>
+        </p:nvPicPr>
+        <p:blipFill>
+          <a:blip r:embed="rId1"/>
+          <a:stretch>
+            <a:fillRect/>
+          </a:stretch>
+        </p:blipFill>
+        <p:spPr>
+          <a:xfrm>
+            <a:off x="-748030" y="436245"/>
+            <a:ext cx="10640060" cy="5984875"/>
+          </a:xfrm>
+          <a:prstGeom prst="rect">
+            <a:avLst/>
+          </a:prstGeom>
+        </p:spPr>
+      </p:pic>
+    </p:spTree>
+  </p:cSld>
+  <p:clrMapOvr>
+    <a:masterClrMapping/>
+  </p:clrMapOvr>
+  <p:timing>
+    <p:tnLst>
+      <p:par>
+        <p:cTn id="1" dur="indefinite" restart="never" nodeType="tmRoot">
+          <p:childTnLst>
+            <p:seq concurrent="1" nextAc="seek">
+              <p:cTn id="2" dur="indefinite" nodeType="mainSeq">
+                <p:childTnLst>
+                  <p:par>
+                    <p:cTn id="3" fill="hold">
+                      <p:stCondLst>
+                        <p:cond delay="indefinite"/>
+                      </p:stCondLst>
+                      <p:childTnLst>
+                        <p:par>
+                          <p:cTn id="4" fill="hold">
+                            <p:stCondLst>
+                              <p:cond delay="0"/>
+                            </p:stCondLst>
+                            <p:childTnLst>
+                              <p:par>
+                                <p:cTn id="5" presetID="1" presetClass="entr" presetSubtype="0" fill="hold" nodeType="clickEffect">
+                                  <p:stCondLst>
+                                    <p:cond delay="0"/>
+                                  </p:stCondLst>
+                                  <p:childTnLst>
+                                    <p:set>
+                                      <p:cBhvr>
+                                        <p:cTn id="6" dur="1" fill="hold">
+                                          <p:stCondLst>
+                                            <p:cond delay="0"/>
+                                          </p:stCondLst>
+                                        </p:cTn>
+                                        <p:tgtEl>
+                                          <p:spTgt spid="5"/>
+                                        </p:tgtEl>
+                                        <p:attrNameLst>
+                                          <p:attrName>style.visibility</p:attrName>
+                                        </p:attrNameLst>
+                                      </p:cBhvr>
+                                      <p:to>
+                                        <p:strVal val="visible"/>
+                                      </p:to>
+                                    </p:set>
+                                  </p:childTnLst>
+                                </p:cTn>
+                              </p:par>
+                            </p:childTnLst>
+                          </p:cTn>
+                        </p:par>
+                      </p:childTnLst>
+                    </p:cTn>
+                  </p:par>
+                </p:childTnLst>
+              </p:cTn>
+              <p:prevCondLst>
+                <p:cond evt="onPrev" delay="0">
+                  <p:tgtEl>
+                    <p:sldTgt/>
+                  </p:tgtEl>
+                </p:cond>
+              </p:prevCondLst>
+              <p:nextCondLst>
+                <p:cond evt="onNext" delay="0">
+                  <p:tgtEl>
+                    <p:sldTgt/>
+                  </p:tgtEl>
+                </p:cond>
+              </p:nextCondLst>
+            </p:seq>
+          </p:childTnLst>
+        </p:cTn>
+      </p:par>
+    </p:tnLst>
+  </p:timing>
+</p:sld>
+</file>
+
+<file path=ppt/slides/slide23.xml><?xml version="1.0" encoding="utf-8"?>
+<p:sld xmlns:a="http://schemas.openxmlformats.org/drawingml/2006/main" xmlns:r="http://schemas.openxmlformats.org/officeDocument/2006/relationships" xmlns:p="http://schemas.openxmlformats.org/presentationml/2006/main">
+  <p:cSld>
+    <p:spTree>
+      <p:nvGrpSpPr>
+        <p:cNvPr id="1" name=""/>
+        <p:cNvGrpSpPr/>
+        <p:nvPr/>
+      </p:nvGrpSpPr>
+      <p:grpSpPr/>
+      <p:sp>
+        <p:nvSpPr>
+          <p:cNvPr id="2" name="Title 1"/>
+          <p:cNvSpPr>
+            <a:spLocks noGrp="1"/>
+          </p:cNvSpPr>
+          <p:nvPr>
+            <p:ph type="title"/>
+          </p:nvPr>
+        </p:nvSpPr>
+        <p:spPr/>
+        <p:txBody>
+          <a:bodyPr/>
+          <a:p>
+            <a:r>
+              <a:rPr lang="" altLang="en-US"/>
+              <a:t>Posterior: p(H | D)</a:t>
+            </a:r>
+            <a:endParaRPr lang="" altLang="en-US"/>
+          </a:p>
+        </p:txBody>
+      </p:sp>
+      <p:sp>
+        <p:nvSpPr>
+          <p:cNvPr id="3" name="Content Placeholder 2"/>
+          <p:cNvSpPr>
+            <a:spLocks noGrp="1"/>
+          </p:cNvSpPr>
+          <p:nvPr>
+            <p:ph idx="1"/>
+          </p:nvPr>
+        </p:nvSpPr>
+        <p:spPr/>
+        <p:txBody>
+          <a:bodyPr/>
+          <a:p>
+            <a:r>
+              <a:rPr lang="" altLang="en-US"/>
+              <a:t>Unfortunately it's not generally so Easy™ to figure out p(H | D)</a:t>
+            </a:r>
+            <a:endParaRPr lang="" altLang="en-US"/>
+          </a:p>
+          <a:p>
+            <a:r>
+              <a:rPr lang="" altLang="en-US"/>
+              <a:t>Bayesian modeling provides a lot of </a:t>
+            </a:r>
+            <a:r>
+              <a:rPr lang="" altLang="en-US" b="1"/>
+              <a:t>flexibility</a:t>
+            </a:r>
+            <a:r>
+              <a:rPr lang="" altLang="en-US"/>
+              <a:t>, but at the cost of more involved computations</a:t>
+            </a:r>
+            <a:endParaRPr lang="" altLang="en-US"/>
+          </a:p>
+          <a:p>
+            <a:r>
+              <a:rPr lang="" altLang="en-US"/>
+              <a:t>For certain combinations of prior and likelihood, we can write down in algebraic forms what the posterior is...</a:t>
+            </a:r>
+            <a:endParaRPr lang="" altLang="en-US"/>
+          </a:p>
+        </p:txBody>
+      </p:sp>
+      <p:sp>
+        <p:nvSpPr>
+          <p:cNvPr id="4" name="Slide Number Placeholder 3"/>
+          <p:cNvSpPr>
+            <a:spLocks noGrp="1"/>
+          </p:cNvSpPr>
+          <p:nvPr>
+            <p:ph type="sldNum" sz="quarter" idx="12"/>
+          </p:nvPr>
+        </p:nvSpPr>
+        <p:spPr/>
+        <p:txBody>
+          <a:bodyPr/>
+          <a:p>
+            <a:fld id="{5F80C8D4-EBF1-459B-B948-4CDFA6C62824}" type="slidenum">
+              <a:rPr lang="en-US"/>
+            </a:fld>
+            <a:endParaRPr lang="en-US"/>
+          </a:p>
+        </p:txBody>
+      </p:sp>
+    </p:spTree>
+  </p:cSld>
+  <p:clrMapOvr>
+    <a:masterClrMapping/>
+  </p:clrMapOvr>
+</p:sld>
+</file>
+
+<file path=ppt/slides/slide24.xml><?xml version="1.0" encoding="utf-8"?>
+<p:sld xmlns:a="http://schemas.openxmlformats.org/drawingml/2006/main" xmlns:r="http://schemas.openxmlformats.org/officeDocument/2006/relationships" xmlns:p="http://schemas.openxmlformats.org/presentationml/2006/main">
+  <p:cSld>
+    <p:spTree>
+      <p:nvGrpSpPr>
+        <p:cNvPr id="1" name=""/>
+        <p:cNvGrpSpPr/>
+        <p:nvPr/>
+      </p:nvGrpSpPr>
+      <p:grpSpPr/>
+      <p:sp>
+        <p:nvSpPr>
+          <p:cNvPr id="2" name="Title 1"/>
+          <p:cNvSpPr>
+            <a:spLocks noGrp="1"/>
+          </p:cNvSpPr>
+          <p:nvPr>
+            <p:ph type="title"/>
+          </p:nvPr>
+        </p:nvSpPr>
+        <p:spPr/>
+        <p:txBody>
+          <a:bodyPr/>
+          <a:p>
+            <a:r>
+              <a:rPr lang="" altLang="en-US"/>
+              <a:t>Using samples instead</a:t>
+            </a:r>
+            <a:endParaRPr lang="" altLang="en-US"/>
+          </a:p>
+        </p:txBody>
+      </p:sp>
+      <p:sp>
+        <p:nvSpPr>
+          <p:cNvPr id="3" name="Content Placeholder 2"/>
+          <p:cNvSpPr>
+            <a:spLocks noGrp="1"/>
+          </p:cNvSpPr>
+          <p:nvPr>
+            <p:ph idx="1"/>
+          </p:nvPr>
+        </p:nvSpPr>
+        <p:spPr/>
+        <p:txBody>
+          <a:bodyPr/>
+          <a:p>
+            <a:r>
+              <a:rPr lang="" altLang="en-US"/>
+              <a:t>Working directly with the posterior p(H | D) is generally very hard.</a:t>
+            </a:r>
+            <a:endParaRPr lang="" altLang="en-US"/>
+          </a:p>
+          <a:p>
+            <a:r>
+              <a:rPr lang="" altLang="en-US"/>
+              <a:t>It's often easier to work with </a:t>
+            </a:r>
+            <a:r>
+              <a:rPr lang="" altLang="en-US" b="1"/>
+              <a:t>samples</a:t>
+            </a:r>
+            <a:r>
+              <a:rPr lang="" altLang="en-US"/>
+              <a:t>, a finite set of discrete hypotheses that represent the distribution</a:t>
+            </a:r>
+            <a:endParaRPr lang="" altLang="en-US"/>
+          </a:p>
+        </p:txBody>
+      </p:sp>
+      <p:sp>
+        <p:nvSpPr>
+          <p:cNvPr id="4" name="Slide Number Placeholder 3"/>
+          <p:cNvSpPr>
+            <a:spLocks noGrp="1"/>
+          </p:cNvSpPr>
+          <p:nvPr>
+            <p:ph type="sldNum" sz="quarter" idx="12"/>
+          </p:nvPr>
+        </p:nvSpPr>
+        <p:spPr/>
+        <p:txBody>
+          <a:bodyPr/>
+          <a:p>
+            <a:fld id="{5F80C8D4-EBF1-459B-B948-4CDFA6C62824}" type="slidenum">
+              <a:rPr lang="en-US"/>
+            </a:fld>
+            <a:endParaRPr lang="en-US"/>
+          </a:p>
+        </p:txBody>
+      </p:sp>
+    </p:spTree>
+  </p:cSld>
+  <p:clrMapOvr>
+    <a:masterClrMapping/>
+  </p:clrMapOvr>
+</p:sld>
+</file>
+
+<file path=ppt/slides/slide25.xml><?xml version="1.0" encoding="utf-8"?>
 <p:sld xmlns:a="http://schemas.openxmlformats.org/drawingml/2006/main" xmlns:r="http://schemas.openxmlformats.org/officeDocument/2006/relationships" xmlns:p="http://schemas.openxmlformats.org/presentationml/2006/main">
   <p:cSld>
     <p:spTree>
@@ -6424,7 +7391,7 @@
 </p:sld>
 </file>
 
-<file path=ppt/slides/slide21.xml><?xml version="1.0" encoding="utf-8"?>
+<file path=ppt/slides/slide26.xml><?xml version="1.0" encoding="utf-8"?>
 <p:sld xmlns:a="http://schemas.openxmlformats.org/drawingml/2006/main" xmlns:r="http://schemas.openxmlformats.org/officeDocument/2006/relationships" xmlns:p="http://schemas.openxmlformats.org/presentationml/2006/main">
   <p:cSld>
     <p:spTree>
@@ -6907,7 +7874,7 @@
 </p:sld>
 </file>
 
-<file path=ppt/slides/slide22.xml><?xml version="1.0" encoding="utf-8"?>
+<file path=ppt/slides/slide27.xml><?xml version="1.0" encoding="utf-8"?>
 <p:sld xmlns:a="http://schemas.openxmlformats.org/drawingml/2006/main" xmlns:r="http://schemas.openxmlformats.org/officeDocument/2006/relationships" xmlns:p="http://schemas.openxmlformats.org/presentationml/2006/main">
   <p:cSld>
     <p:spTree>
@@ -7420,7 +8387,7 @@
 </p:sld>
 </file>
 
-<file path=ppt/slides/slide23.xml><?xml version="1.0" encoding="utf-8"?>
+<file path=ppt/slides/slide28.xml><?xml version="1.0" encoding="utf-8"?>
 <p:sld xmlns:a="http://schemas.openxmlformats.org/drawingml/2006/main" xmlns:r="http://schemas.openxmlformats.org/officeDocument/2006/relationships" xmlns:p="http://schemas.openxmlformats.org/presentationml/2006/main">
   <p:cSld>
     <p:spTree>
@@ -7933,7 +8900,7 @@
 </p:sld>
 </file>
 
-<file path=ppt/slides/slide24.xml><?xml version="1.0" encoding="utf-8"?>
+<file path=ppt/slides/slide29.xml><?xml version="1.0" encoding="utf-8"?>
 <p:sld xmlns:a="http://schemas.openxmlformats.org/drawingml/2006/main" xmlns:r="http://schemas.openxmlformats.org/officeDocument/2006/relationships" xmlns:p="http://schemas.openxmlformats.org/presentationml/2006/main">
   <p:cSld>
     <p:spTree>
@@ -8416,7 +9383,227 @@
 </p:sld>
 </file>
 
-<file path=ppt/slides/slide25.xml><?xml version="1.0" encoding="utf-8"?>
+<file path=ppt/slides/slide3.xml><?xml version="1.0" encoding="utf-8"?>
+<p:sld xmlns:a="http://schemas.openxmlformats.org/drawingml/2006/main" xmlns:r="http://schemas.openxmlformats.org/officeDocument/2006/relationships" xmlns:p="http://schemas.openxmlformats.org/presentationml/2006/main">
+  <p:cSld>
+    <p:spTree>
+      <p:nvGrpSpPr>
+        <p:cNvPr id="1" name=""/>
+        <p:cNvGrpSpPr/>
+        <p:nvPr/>
+      </p:nvGrpSpPr>
+      <p:grpSpPr/>
+      <p:sp>
+        <p:nvSpPr>
+          <p:cNvPr id="2" name="Title 1"/>
+          <p:cNvSpPr>
+            <a:spLocks noGrp="1"/>
+          </p:cNvSpPr>
+          <p:nvPr>
+            <p:ph type="title"/>
+          </p:nvPr>
+        </p:nvSpPr>
+        <p:spPr/>
+        <p:txBody>
+          <a:bodyPr/>
+          <a:p>
+            <a:r>
+              <a:rPr lang="en-US" altLang="en-US"/>
+              <a:t>The </a:t>
+            </a:r>
+            <a:r>
+              <a:rPr lang="en-US" altLang="en-US" i="1"/>
+              <a:t>t </a:t>
+            </a:r>
+            <a:r>
+              <a:rPr lang="en-US" altLang="en-US"/>
+              <a:t>test</a:t>
+            </a:r>
+            <a:endParaRPr lang="en-US" altLang="en-US"/>
+          </a:p>
+        </p:txBody>
+      </p:sp>
+      <p:sp>
+        <p:nvSpPr>
+          <p:cNvPr id="3" name="Content Placeholder 2"/>
+          <p:cNvSpPr>
+            <a:spLocks noGrp="1"/>
+          </p:cNvSpPr>
+          <p:nvPr>
+            <p:ph idx="1"/>
+          </p:nvPr>
+        </p:nvSpPr>
+        <p:spPr/>
+        <p:txBody>
+          <a:bodyPr/>
+          <a:p>
+            <a:r>
+              <a:rPr lang="en-US" altLang="en-US"/>
+              <a:t>Take your data </a:t>
+            </a:r>
+            <a:r>
+              <a:rPr lang="en-US" altLang="en-US" i="1"/>
+              <a:t>x</a:t>
+            </a:r>
+            <a:r>
+              <a:rPr lang="en-US" altLang="en-US"/>
+              <a:t>, and calculate the observed mean (sum of x / number of data points)</a:t>
+            </a:r>
+            <a:endParaRPr lang="en-US" altLang="en-US"/>
+          </a:p>
+          <a:p>
+            <a:r>
+              <a:rPr lang="en-US" altLang="en-US"/>
+              <a:t>Divide the observed mean by the sample standard deviation to get the </a:t>
+            </a:r>
+            <a:r>
+              <a:rPr lang="en-US" altLang="en-US" i="1"/>
+              <a:t>t </a:t>
+            </a:r>
+            <a:r>
+              <a:rPr lang="en-US" altLang="en-US"/>
+              <a:t>statistic</a:t>
+            </a:r>
+            <a:endParaRPr lang="en-US" altLang="en-US"/>
+          </a:p>
+          <a:p>
+            <a:r>
+              <a:rPr lang="en-US" altLang="en-US"/>
+              <a:t>Look up the p value in a table/using SPSS/R/whatever.</a:t>
+            </a:r>
+            <a:endParaRPr lang="en-US" altLang="en-US"/>
+          </a:p>
+        </p:txBody>
+      </p:sp>
+      <p:sp>
+        <p:nvSpPr>
+          <p:cNvPr id="4" name="Slide Number Placeholder 3"/>
+          <p:cNvSpPr>
+            <a:spLocks noGrp="1"/>
+          </p:cNvSpPr>
+          <p:nvPr>
+            <p:ph type="sldNum" sz="quarter" idx="12"/>
+          </p:nvPr>
+        </p:nvSpPr>
+        <p:spPr/>
+        <p:txBody>
+          <a:bodyPr/>
+          <a:p>
+            <a:fld id="{5F80C8D4-EBF1-459B-B948-4CDFA6C62824}" type="slidenum">
+              <a:rPr lang="en-US"/>
+            </a:fld>
+            <a:endParaRPr lang="en-US"/>
+          </a:p>
+        </p:txBody>
+      </p:sp>
+      <p:pic>
+        <p:nvPicPr>
+          <p:cNvPr id="5" name="Picture 4"/>
+          <p:cNvPicPr>
+            <a:picLocks noChangeAspect="1"/>
+          </p:cNvPicPr>
+          <p:nvPr/>
+        </p:nvPicPr>
+        <p:blipFill>
+          <a:blip r:embed="rId1"/>
+          <a:stretch>
+            <a:fillRect/>
+          </a:stretch>
+        </p:blipFill>
+        <p:spPr>
+          <a:xfrm>
+            <a:off x="-748030" y="436245"/>
+            <a:ext cx="10640060" cy="5984875"/>
+          </a:xfrm>
+          <a:prstGeom prst="rect">
+            <a:avLst/>
+          </a:prstGeom>
+        </p:spPr>
+      </p:pic>
+    </p:spTree>
+  </p:cSld>
+  <p:clrMapOvr>
+    <a:masterClrMapping/>
+  </p:clrMapOvr>
+  <p:timing>
+    <p:tnLst>
+      <p:par>
+        <p:cTn id="1" dur="indefinite" restart="never" nodeType="tmRoot">
+          <p:childTnLst>
+            <p:seq concurrent="1" nextAc="seek">
+              <p:cTn id="2" dur="indefinite" nodeType="mainSeq">
+                <p:childTnLst>
+                  <p:par>
+                    <p:cTn id="3" fill="hold">
+                      <p:stCondLst>
+                        <p:cond delay="indefinite"/>
+                      </p:stCondLst>
+                      <p:childTnLst>
+                        <p:par>
+                          <p:cTn id="4" fill="hold">
+                            <p:stCondLst>
+                              <p:cond delay="0"/>
+                            </p:stCondLst>
+                            <p:childTnLst>
+                              <p:par>
+                                <p:cTn id="5" presetID="1" presetClass="entr" presetSubtype="0" fill="hold" nodeType="clickEffect">
+                                  <p:stCondLst>
+                                    <p:cond delay="0"/>
+                                  </p:stCondLst>
+                                  <p:childTnLst>
+                                    <p:set>
+                                      <p:cBhvr>
+                                        <p:cTn id="6" dur="1" fill="hold">
+                                          <p:stCondLst>
+                                            <p:cond delay="0"/>
+                                          </p:stCondLst>
+                                        </p:cTn>
+                                        <p:tgtEl>
+                                          <p:spTgt spid="5"/>
+                                        </p:tgtEl>
+                                        <p:attrNameLst>
+                                          <p:attrName>style.visibility</p:attrName>
+                                        </p:attrNameLst>
+                                      </p:cBhvr>
+                                      <p:to>
+                                        <p:strVal val="visible"/>
+                                      </p:to>
+                                    </p:set>
+                                  </p:childTnLst>
+                                </p:cTn>
+                              </p:par>
+                            </p:childTnLst>
+                          </p:cTn>
+                        </p:par>
+                      </p:childTnLst>
+                    </p:cTn>
+                  </p:par>
+                </p:childTnLst>
+              </p:cTn>
+              <p:prevCondLst>
+                <p:cond evt="onPrev" delay="0">
+                  <p:tgtEl>
+                    <p:sldTgt/>
+                  </p:tgtEl>
+                </p:cond>
+              </p:prevCondLst>
+              <p:nextCondLst>
+                <p:cond evt="onNext" delay="0">
+                  <p:tgtEl>
+                    <p:sldTgt/>
+                  </p:tgtEl>
+                </p:cond>
+              </p:nextCondLst>
+            </p:seq>
+          </p:childTnLst>
+        </p:cTn>
+      </p:par>
+    </p:tnLst>
+  </p:timing>
+</p:sld>
+</file>
+
+<file path=ppt/slides/slide30.xml><?xml version="1.0" encoding="utf-8"?>
 <p:sld xmlns:a="http://schemas.openxmlformats.org/drawingml/2006/main" xmlns:r="http://schemas.openxmlformats.org/officeDocument/2006/relationships" xmlns:p="http://schemas.openxmlformats.org/presentationml/2006/main">
   <p:cSld>
     <p:spTree>
@@ -8899,7 +10086,7 @@
 </p:sld>
 </file>
 
-<file path=ppt/slides/slide26.xml><?xml version="1.0" encoding="utf-8"?>
+<file path=ppt/slides/slide31.xml><?xml version="1.0" encoding="utf-8"?>
 <p:sld xmlns:a="http://schemas.openxmlformats.org/drawingml/2006/main" xmlns:r="http://schemas.openxmlformats.org/officeDocument/2006/relationships" xmlns:p="http://schemas.openxmlformats.org/presentationml/2006/main">
   <p:cSld>
     <p:spTree>
@@ -9382,7 +10569,7 @@
 </p:sld>
 </file>
 
-<file path=ppt/slides/slide27.xml><?xml version="1.0" encoding="utf-8"?>
+<file path=ppt/slides/slide32.xml><?xml version="1.0" encoding="utf-8"?>
 <p:sld xmlns:a="http://schemas.openxmlformats.org/drawingml/2006/main" xmlns:r="http://schemas.openxmlformats.org/officeDocument/2006/relationships" xmlns:p="http://schemas.openxmlformats.org/presentationml/2006/main">
   <p:cSld>
     <p:spTree>
@@ -9865,7 +11052,7 @@
 </p:sld>
 </file>
 
-<file path=ppt/slides/slide28.xml><?xml version="1.0" encoding="utf-8"?>
+<file path=ppt/slides/slide33.xml><?xml version="1.0" encoding="utf-8"?>
 <p:sld xmlns:a="http://schemas.openxmlformats.org/drawingml/2006/main" xmlns:r="http://schemas.openxmlformats.org/officeDocument/2006/relationships" xmlns:p="http://schemas.openxmlformats.org/presentationml/2006/main">
   <p:cSld>
     <p:spTree>
@@ -10348,7 +11535,7 @@
 </p:sld>
 </file>
 
-<file path=ppt/slides/slide29.xml><?xml version="1.0" encoding="utf-8"?>
+<file path=ppt/slides/slide34.xml><?xml version="1.0" encoding="utf-8"?>
 <p:sld xmlns:a="http://schemas.openxmlformats.org/drawingml/2006/main" xmlns:r="http://schemas.openxmlformats.org/officeDocument/2006/relationships" xmlns:p="http://schemas.openxmlformats.org/presentationml/2006/main">
   <p:cSld>
     <p:spTree>
@@ -10831,227 +12018,7 @@
 </p:sld>
 </file>
 
-<file path=ppt/slides/slide3.xml><?xml version="1.0" encoding="utf-8"?>
-<p:sld xmlns:a="http://schemas.openxmlformats.org/drawingml/2006/main" xmlns:r="http://schemas.openxmlformats.org/officeDocument/2006/relationships" xmlns:p="http://schemas.openxmlformats.org/presentationml/2006/main">
-  <p:cSld>
-    <p:spTree>
-      <p:nvGrpSpPr>
-        <p:cNvPr id="1" name=""/>
-        <p:cNvGrpSpPr/>
-        <p:nvPr/>
-      </p:nvGrpSpPr>
-      <p:grpSpPr/>
-      <p:sp>
-        <p:nvSpPr>
-          <p:cNvPr id="2" name="Title 1"/>
-          <p:cNvSpPr>
-            <a:spLocks noGrp="1"/>
-          </p:cNvSpPr>
-          <p:nvPr>
-            <p:ph type="title"/>
-          </p:nvPr>
-        </p:nvSpPr>
-        <p:spPr/>
-        <p:txBody>
-          <a:bodyPr/>
-          <a:p>
-            <a:r>
-              <a:rPr lang="" altLang="en-US"/>
-              <a:t>The </a:t>
-            </a:r>
-            <a:r>
-              <a:rPr lang="" altLang="en-US" i="1"/>
-              <a:t>t </a:t>
-            </a:r>
-            <a:r>
-              <a:rPr lang="" altLang="en-US"/>
-              <a:t>test</a:t>
-            </a:r>
-            <a:endParaRPr lang="" altLang="en-US"/>
-          </a:p>
-        </p:txBody>
-      </p:sp>
-      <p:sp>
-        <p:nvSpPr>
-          <p:cNvPr id="3" name="Content Placeholder 2"/>
-          <p:cNvSpPr>
-            <a:spLocks noGrp="1"/>
-          </p:cNvSpPr>
-          <p:nvPr>
-            <p:ph idx="1"/>
-          </p:nvPr>
-        </p:nvSpPr>
-        <p:spPr/>
-        <p:txBody>
-          <a:bodyPr/>
-          <a:p>
-            <a:r>
-              <a:rPr lang="" altLang="en-US"/>
-              <a:t>Take your data </a:t>
-            </a:r>
-            <a:r>
-              <a:rPr lang="" altLang="en-US" i="1"/>
-              <a:t>x</a:t>
-            </a:r>
-            <a:r>
-              <a:rPr lang="" altLang="en-US"/>
-              <a:t>, and calculate the observed mean (sum of x / number of data points)</a:t>
-            </a:r>
-            <a:endParaRPr lang="" altLang="en-US"/>
-          </a:p>
-          <a:p>
-            <a:r>
-              <a:rPr lang="" altLang="en-US"/>
-              <a:t>Divide the observed mean by the sample standard deviation to get the </a:t>
-            </a:r>
-            <a:r>
-              <a:rPr lang="" altLang="en-US" i="1"/>
-              <a:t>t </a:t>
-            </a:r>
-            <a:r>
-              <a:rPr lang="" altLang="en-US"/>
-              <a:t>statistic</a:t>
-            </a:r>
-            <a:endParaRPr lang="" altLang="en-US"/>
-          </a:p>
-          <a:p>
-            <a:r>
-              <a:rPr lang="" altLang="en-US"/>
-              <a:t>Look up the p value in a table/using SPSS/R/whatever.</a:t>
-            </a:r>
-            <a:endParaRPr lang="" altLang="en-US"/>
-          </a:p>
-        </p:txBody>
-      </p:sp>
-      <p:sp>
-        <p:nvSpPr>
-          <p:cNvPr id="4" name="Slide Number Placeholder 3"/>
-          <p:cNvSpPr>
-            <a:spLocks noGrp="1"/>
-          </p:cNvSpPr>
-          <p:nvPr>
-            <p:ph type="sldNum" sz="quarter" idx="12"/>
-          </p:nvPr>
-        </p:nvSpPr>
-        <p:spPr/>
-        <p:txBody>
-          <a:bodyPr/>
-          <a:p>
-            <a:fld id="{5F80C8D4-EBF1-459B-B948-4CDFA6C62824}" type="slidenum">
-              <a:rPr lang="en-US"/>
-            </a:fld>
-            <a:endParaRPr lang="en-US"/>
-          </a:p>
-        </p:txBody>
-      </p:sp>
-      <p:pic>
-        <p:nvPicPr>
-          <p:cNvPr id="5" name="Picture 4"/>
-          <p:cNvPicPr>
-            <a:picLocks noChangeAspect="1"/>
-          </p:cNvPicPr>
-          <p:nvPr/>
-        </p:nvPicPr>
-        <p:blipFill>
-          <a:blip r:embed="rId1"/>
-          <a:stretch>
-            <a:fillRect/>
-          </a:stretch>
-        </p:blipFill>
-        <p:spPr>
-          <a:xfrm>
-            <a:off x="-748030" y="436245"/>
-            <a:ext cx="10640060" cy="5984875"/>
-          </a:xfrm>
-          <a:prstGeom prst="rect">
-            <a:avLst/>
-          </a:prstGeom>
-        </p:spPr>
-      </p:pic>
-    </p:spTree>
-  </p:cSld>
-  <p:clrMapOvr>
-    <a:masterClrMapping/>
-  </p:clrMapOvr>
-  <p:timing>
-    <p:tnLst>
-      <p:par>
-        <p:cTn id="1" dur="indefinite" restart="never" nodeType="tmRoot">
-          <p:childTnLst>
-            <p:seq concurrent="1" nextAc="seek">
-              <p:cTn id="2" dur="indefinite" nodeType="mainSeq">
-                <p:childTnLst>
-                  <p:par>
-                    <p:cTn id="3" fill="hold">
-                      <p:stCondLst>
-                        <p:cond delay="indefinite"/>
-                      </p:stCondLst>
-                      <p:childTnLst>
-                        <p:par>
-                          <p:cTn id="4" fill="hold">
-                            <p:stCondLst>
-                              <p:cond delay="0"/>
-                            </p:stCondLst>
-                            <p:childTnLst>
-                              <p:par>
-                                <p:cTn id="5" presetID="1" presetClass="entr" presetSubtype="0" fill="hold" nodeType="clickEffect">
-                                  <p:stCondLst>
-                                    <p:cond delay="0"/>
-                                  </p:stCondLst>
-                                  <p:childTnLst>
-                                    <p:set>
-                                      <p:cBhvr>
-                                        <p:cTn id="6" dur="1" fill="hold">
-                                          <p:stCondLst>
-                                            <p:cond delay="0"/>
-                                          </p:stCondLst>
-                                        </p:cTn>
-                                        <p:tgtEl>
-                                          <p:spTgt spid="5"/>
-                                        </p:tgtEl>
-                                        <p:attrNameLst>
-                                          <p:attrName>style.visibility</p:attrName>
-                                        </p:attrNameLst>
-                                      </p:cBhvr>
-                                      <p:to>
-                                        <p:strVal val="visible"/>
-                                      </p:to>
-                                    </p:set>
-                                  </p:childTnLst>
-                                </p:cTn>
-                              </p:par>
-                            </p:childTnLst>
-                          </p:cTn>
-                        </p:par>
-                      </p:childTnLst>
-                    </p:cTn>
-                  </p:par>
-                </p:childTnLst>
-              </p:cTn>
-              <p:prevCondLst>
-                <p:cond evt="onPrev" delay="0">
-                  <p:tgtEl>
-                    <p:sldTgt/>
-                  </p:tgtEl>
-                </p:cond>
-              </p:prevCondLst>
-              <p:nextCondLst>
-                <p:cond evt="onNext" delay="0">
-                  <p:tgtEl>
-                    <p:sldTgt/>
-                  </p:tgtEl>
-                </p:cond>
-              </p:nextCondLst>
-            </p:seq>
-          </p:childTnLst>
-        </p:cTn>
-      </p:par>
-    </p:tnLst>
-  </p:timing>
-</p:sld>
-</file>
-
-<file path=ppt/slides/slide30.xml><?xml version="1.0" encoding="utf-8"?>
+<file path=ppt/slides/slide35.xml><?xml version="1.0" encoding="utf-8"?>
 <p:sld xmlns:a="http://schemas.openxmlformats.org/drawingml/2006/main" xmlns:r="http://schemas.openxmlformats.org/officeDocument/2006/relationships" xmlns:p="http://schemas.openxmlformats.org/presentationml/2006/main">
   <p:cSld>
     <p:spTree>
@@ -11534,6 +12501,283 @@
 </p:sld>
 </file>
 
+<file path=ppt/slides/slide36.xml><?xml version="1.0" encoding="utf-8"?>
+<p:sld xmlns:a="http://schemas.openxmlformats.org/drawingml/2006/main" xmlns:r="http://schemas.openxmlformats.org/officeDocument/2006/relationships" xmlns:p="http://schemas.openxmlformats.org/presentationml/2006/main">
+  <p:cSld>
+    <p:spTree>
+      <p:nvGrpSpPr>
+        <p:cNvPr id="1" name=""/>
+        <p:cNvGrpSpPr/>
+        <p:nvPr/>
+      </p:nvGrpSpPr>
+      <p:grpSpPr/>
+      <p:sp>
+        <p:nvSpPr>
+          <p:cNvPr id="2" name="Title 1"/>
+          <p:cNvSpPr>
+            <a:spLocks noGrp="1"/>
+          </p:cNvSpPr>
+          <p:nvPr>
+            <p:ph type="title"/>
+          </p:nvPr>
+        </p:nvSpPr>
+        <p:spPr/>
+        <p:txBody>
+          <a:bodyPr/>
+          <a:p>
+            <a:r>
+              <a:rPr lang="" altLang="en-US"/>
+              <a:t>What good is p(H | D)?</a:t>
+            </a:r>
+            <a:endParaRPr lang="" altLang="en-US"/>
+          </a:p>
+        </p:txBody>
+      </p:sp>
+      <p:sp>
+        <p:nvSpPr>
+          <p:cNvPr id="3" name="Content Placeholder 2"/>
+          <p:cNvSpPr>
+            <a:spLocks noGrp="1"/>
+          </p:cNvSpPr>
+          <p:nvPr>
+            <p:ph idx="1"/>
+          </p:nvPr>
+        </p:nvSpPr>
+        <p:spPr/>
+        <p:txBody>
+          <a:bodyPr/>
+          <a:p>
+            <a:r>
+              <a:rPr lang="" altLang="en-US"/>
+              <a:t>Once you can calculate e.g. p(mean = x | data), you can do all kinds of useful things.</a:t>
+            </a:r>
+            <a:endParaRPr lang="" altLang="en-US"/>
+          </a:p>
+          <a:p>
+            <a:r>
+              <a:rPr lang="" altLang="en-US"/>
+              <a:t>You can use conditional probability to “ask questions” of the posterior: </a:t>
+            </a:r>
+            <a:endParaRPr lang="" altLang="en-US"/>
+          </a:p>
+          <a:p>
+            <a:pPr lvl="1"/>
+            <a:r>
+              <a:rPr lang="" altLang="en-US"/>
+              <a:t>p(mean &gt; 0) = </a:t>
+            </a:r>
+            <a:br>
+              <a:rPr lang="" altLang="en-US"/>
+            </a:br>
+            <a:r>
+              <a:rPr lang="" altLang="en-US"/>
+              <a:t>     ∫ p(x&gt;0|mean=x)p(mean=x|data) d</a:t>
+            </a:r>
+            <a:r>
+              <a:rPr lang="" altLang="en-US" i="1"/>
+              <a:t>mean</a:t>
+            </a:r>
+            <a:endParaRPr lang="" altLang="en-US" i="1"/>
+          </a:p>
+          <a:p>
+            <a:pPr lvl="1"/>
+            <a:r>
+              <a:rPr lang="" altLang="en-US"/>
+              <a:t>(or, count the fraction of sampled values for mean greater than zero)</a:t>
+            </a:r>
+            <a:endParaRPr lang="" altLang="en-US"/>
+          </a:p>
+        </p:txBody>
+      </p:sp>
+      <p:sp>
+        <p:nvSpPr>
+          <p:cNvPr id="4" name="Slide Number Placeholder 3"/>
+          <p:cNvSpPr>
+            <a:spLocks noGrp="1"/>
+          </p:cNvSpPr>
+          <p:nvPr>
+            <p:ph type="sldNum" sz="quarter" idx="12"/>
+          </p:nvPr>
+        </p:nvSpPr>
+        <p:spPr/>
+        <p:txBody>
+          <a:bodyPr/>
+          <a:p>
+            <a:fld id="{5F80C8D4-EBF1-459B-B948-4CDFA6C62824}" type="slidenum">
+              <a:rPr lang="en-US"/>
+            </a:fld>
+            <a:endParaRPr lang="en-US"/>
+          </a:p>
+        </p:txBody>
+      </p:sp>
+    </p:spTree>
+  </p:cSld>
+  <p:clrMapOvr>
+    <a:masterClrMapping/>
+  </p:clrMapOvr>
+</p:sld>
+</file>
+
+<file path=ppt/slides/slide37.xml><?xml version="1.0" encoding="utf-8"?>
+<p:sld xmlns:a="http://schemas.openxmlformats.org/drawingml/2006/main" xmlns:r="http://schemas.openxmlformats.org/officeDocument/2006/relationships" xmlns:p="http://schemas.openxmlformats.org/presentationml/2006/main">
+  <p:cSld>
+    <p:spTree>
+      <p:nvGrpSpPr>
+        <p:cNvPr id="1" name=""/>
+        <p:cNvGrpSpPr/>
+        <p:nvPr/>
+      </p:nvGrpSpPr>
+      <p:grpSpPr/>
+      <p:sp>
+        <p:nvSpPr>
+          <p:cNvPr id="2" name="Title 1"/>
+          <p:cNvSpPr>
+            <a:spLocks noGrp="1"/>
+          </p:cNvSpPr>
+          <p:nvPr>
+            <p:ph type="title"/>
+          </p:nvPr>
+        </p:nvSpPr>
+        <p:spPr>
+          <a:xfrm>
+            <a:off x="685800" y="609600"/>
+            <a:ext cx="8238490" cy="1143000"/>
+          </a:xfrm>
+        </p:spPr>
+        <p:txBody>
+          <a:bodyPr/>
+          <a:p>
+            <a:r>
+              <a:rPr lang="" altLang="en-US"/>
+              <a:t>Assumptions: </a:t>
+            </a:r>
+            <a:r>
+              <a:rPr lang="" altLang="en-US" b="0"/>
+              <a:t>p(H|D,</a:t>
+            </a:r>
+            <a:r>
+              <a:rPr lang="" altLang="en-US"/>
+              <a:t>model</a:t>
+            </a:r>
+            <a:r>
+              <a:rPr lang="" altLang="en-US" b="0"/>
+              <a:t>)</a:t>
+            </a:r>
+            <a:endParaRPr lang="" altLang="en-US" b="0"/>
+          </a:p>
+        </p:txBody>
+      </p:sp>
+      <p:sp>
+        <p:nvSpPr>
+          <p:cNvPr id="3" name="Content Placeholder 2"/>
+          <p:cNvSpPr>
+            <a:spLocks noGrp="1"/>
+          </p:cNvSpPr>
+          <p:nvPr>
+            <p:ph idx="1"/>
+          </p:nvPr>
+        </p:nvSpPr>
+        <p:spPr/>
+        <p:txBody>
+          <a:bodyPr/>
+          <a:p>
+            <a:r>
+              <a:rPr lang="" altLang="en-US"/>
+              <a:t>Inferences all depend implicitly on the choices you make</a:t>
+            </a:r>
+            <a:endParaRPr lang="" altLang="en-US"/>
+          </a:p>
+          <a:p>
+            <a:pPr lvl="1"/>
+            <a:r>
+              <a:rPr lang="" altLang="en-US"/>
+              <a:t>Choice of prior</a:t>
+            </a:r>
+            <a:endParaRPr lang="" altLang="en-US"/>
+          </a:p>
+          <a:p>
+            <a:pPr lvl="1"/>
+            <a:r>
+              <a:rPr lang="" altLang="en-US"/>
+              <a:t>Choice of </a:t>
+            </a:r>
+            <a:r>
+              <a:rPr lang="" altLang="en-US" b="1"/>
+              <a:t>generative model</a:t>
+            </a:r>
+            <a:endParaRPr lang="" altLang="en-US" b="1"/>
+          </a:p>
+          <a:p>
+            <a:pPr lvl="0"/>
+            <a:r>
+              <a:rPr lang="" altLang="en-US"/>
+              <a:t>Inferences are only valid as long as those assumptions are true</a:t>
+            </a:r>
+            <a:endParaRPr lang="" altLang="en-US"/>
+          </a:p>
+          <a:p>
+            <a:pPr lvl="1"/>
+            <a:r>
+              <a:rPr lang="" altLang="en-US"/>
+              <a:t>They never are</a:t>
+            </a:r>
+            <a:endParaRPr lang="" altLang="en-US"/>
+          </a:p>
+          <a:p>
+            <a:pPr lvl="1"/>
+            <a:r>
+              <a:rPr lang="" altLang="en-US"/>
+              <a:t>But in practice often close enough</a:t>
+            </a:r>
+            <a:endParaRPr lang="" altLang="en-US"/>
+          </a:p>
+          <a:p>
+            <a:pPr lvl="1"/>
+            <a:r>
+              <a:rPr lang="" altLang="en-US"/>
+              <a:t>Important to </a:t>
+            </a:r>
+            <a:r>
+              <a:rPr lang="" altLang="en-US" b="1"/>
+              <a:t>check</a:t>
+            </a:r>
+            <a:r>
+              <a:rPr lang="" altLang="en-US"/>
+              <a:t> your assumptions!</a:t>
+            </a:r>
+            <a:endParaRPr lang="" altLang="en-US"/>
+          </a:p>
+        </p:txBody>
+      </p:sp>
+      <p:sp>
+        <p:nvSpPr>
+          <p:cNvPr id="4" name="Slide Number Placeholder 3"/>
+          <p:cNvSpPr>
+            <a:spLocks noGrp="1"/>
+          </p:cNvSpPr>
+          <p:nvPr>
+            <p:ph type="sldNum" sz="quarter" idx="12"/>
+          </p:nvPr>
+        </p:nvSpPr>
+        <p:spPr/>
+        <p:txBody>
+          <a:bodyPr/>
+          <a:p>
+            <a:fld id="{5F80C8D4-EBF1-459B-B948-4CDFA6C62824}" type="slidenum">
+              <a:rPr lang="en-US"/>
+            </a:fld>
+            <a:endParaRPr lang="en-US"/>
+          </a:p>
+        </p:txBody>
+      </p:sp>
+    </p:spTree>
+  </p:cSld>
+  <p:clrMapOvr>
+    <a:masterClrMapping/>
+  </p:clrMapOvr>
+</p:sld>
+</file>
+
 <file path=ppt/slides/slide4.xml><?xml version="1.0" encoding="utf-8"?>
 <p:sld xmlns:a="http://schemas.openxmlformats.org/drawingml/2006/main" xmlns:r="http://schemas.openxmlformats.org/officeDocument/2006/relationships" xmlns:p="http://schemas.openxmlformats.org/presentationml/2006/main">
   <p:cSld>
@@ -11559,10 +12803,10 @@
           <a:bodyPr/>
           <a:p>
             <a:r>
-              <a:rPr lang="" altLang="en-US"/>
+              <a:rPr lang="en-US" altLang="en-US"/>
               <a:t>Think...</a:t>
             </a:r>
-            <a:endParaRPr lang="" altLang="en-US"/>
+            <a:endParaRPr lang="en-US" altLang="en-US"/>
           </a:p>
         </p:txBody>
       </p:sp>
@@ -11581,73 +12825,73 @@
           <a:bodyPr/>
           <a:p>
             <a:r>
-              <a:rPr lang="" altLang="en-US"/>
+              <a:rPr lang="en-US" altLang="en-US"/>
               <a:t>What </a:t>
             </a:r>
             <a:r>
-              <a:rPr lang="" altLang="en-US" b="1"/>
+              <a:rPr lang="en-US" altLang="en-US" b="1"/>
               <a:t>is</a:t>
             </a:r>
             <a:r>
-              <a:rPr lang="" altLang="en-US"/>
+              <a:rPr lang="en-US" altLang="en-US"/>
               <a:t> a probability (e.g. a </a:t>
             </a:r>
             <a:r>
-              <a:rPr lang="" altLang="en-US" i="1"/>
+              <a:rPr lang="en-US" altLang="en-US" i="1"/>
               <a:t>p </a:t>
             </a:r>
             <a:r>
-              <a:rPr lang="" altLang="en-US"/>
+              <a:rPr lang="en-US" altLang="en-US"/>
               <a:t>value)?</a:t>
             </a:r>
-            <a:endParaRPr lang="" altLang="en-US"/>
-          </a:p>
-          <a:p>
-            <a:r>
-              <a:rPr lang="" altLang="en-US"/>
+            <a:endParaRPr lang="en-US" altLang="en-US"/>
+          </a:p>
+          <a:p>
+            <a:r>
+              <a:rPr lang="en-US" altLang="en-US"/>
               <a:t>Take for example a two-tailed </a:t>
             </a:r>
             <a:r>
-              <a:rPr lang="" altLang="en-US" i="1"/>
+              <a:rPr lang="en-US" altLang="en-US" i="1"/>
               <a:t>t</a:t>
             </a:r>
             <a:r>
-              <a:rPr lang="" altLang="en-US"/>
+              <a:rPr lang="en-US" altLang="en-US"/>
               <a:t> test, where </a:t>
             </a:r>
             <a:r>
-              <a:rPr lang="" altLang="en-US" i="1"/>
+              <a:rPr lang="en-US" altLang="en-US" i="1"/>
               <a:t>p</a:t>
             </a:r>
             <a:r>
-              <a:rPr lang="" altLang="en-US"/>
+              <a:rPr lang="en-US" altLang="en-US"/>
               <a:t> = 0.02</a:t>
             </a:r>
-            <a:endParaRPr lang="" altLang="en-US"/>
+            <a:endParaRPr lang="en-US" altLang="en-US"/>
           </a:p>
           <a:p>
             <a:pPr lvl="1"/>
             <a:r>
-              <a:rPr lang="" altLang="en-US"/>
+              <a:rPr lang="en-US" altLang="en-US"/>
               <a:t>What does that p value mean?</a:t>
             </a:r>
-            <a:endParaRPr lang="" altLang="en-US"/>
+            <a:endParaRPr lang="en-US" altLang="en-US"/>
           </a:p>
           <a:p>
             <a:pPr lvl="1"/>
             <a:r>
-              <a:rPr lang="" altLang="en-US"/>
+              <a:rPr lang="en-US" altLang="en-US"/>
               <a:t>What can you </a:t>
             </a:r>
             <a:r>
-              <a:rPr lang="" altLang="en-US" b="1"/>
+              <a:rPr lang="en-US" altLang="en-US" b="1"/>
               <a:t>infer </a:t>
             </a:r>
             <a:r>
-              <a:rPr lang="" altLang="en-US"/>
+              <a:rPr lang="en-US" altLang="en-US"/>
               <a:t>about the process that generated your data, based on this test?</a:t>
             </a:r>
-            <a:endParaRPr lang="" altLang="en-US"/>
+            <a:endParaRPr lang="en-US" altLang="en-US"/>
           </a:p>
         </p:txBody>
       </p:sp>
@@ -11705,14 +12949,14 @@
           <a:bodyPr/>
           <a:p>
             <a:r>
-              <a:rPr lang="" altLang="en-US"/>
+              <a:rPr lang="en-US" altLang="en-US"/>
               <a:t>Frequentist </a:t>
             </a:r>
             <a:r>
-              <a:rPr lang="" altLang="en-US" b="0"/>
+              <a:rPr lang="en-US" altLang="en-US" b="0"/>
               <a:t>probability</a:t>
             </a:r>
-            <a:endParaRPr lang="" altLang="en-US" b="0"/>
+            <a:endParaRPr lang="en-US" altLang="en-US" b="0"/>
           </a:p>
         </p:txBody>
       </p:sp>
@@ -11731,45 +12975,45 @@
           <a:bodyPr/>
           <a:p>
             <a:r>
-              <a:rPr lang="" altLang="en-US"/>
+              <a:rPr lang="en-US" altLang="en-US"/>
               <a:t>Frequentists define probability as the </a:t>
             </a:r>
             <a:r>
-              <a:rPr lang="" altLang="en-US" b="1"/>
+              <a:rPr lang="en-US" altLang="en-US" b="1"/>
               <a:t>long-run frequency</a:t>
             </a:r>
             <a:r>
-              <a:rPr lang="" altLang="en-US"/>
+              <a:rPr lang="en-US" altLang="en-US"/>
               <a:t> of an event under replication of a random process</a:t>
             </a:r>
-            <a:endParaRPr lang="" altLang="en-US"/>
-          </a:p>
-          <a:p>
-            <a:r>
-              <a:rPr lang="" altLang="en-US"/>
+            <a:endParaRPr lang="en-US" altLang="en-US"/>
+          </a:p>
+          <a:p>
+            <a:r>
+              <a:rPr lang="en-US" altLang="en-US"/>
               <a:t>Frequentist probability is only ever associated with </a:t>
             </a:r>
             <a:r>
-              <a:rPr lang="" altLang="en-US" b="1"/>
+              <a:rPr lang="en-US" altLang="en-US" b="1"/>
               <a:t>data</a:t>
             </a:r>
             <a:r>
-              <a:rPr lang="" altLang="en-US"/>
+              <a:rPr lang="en-US" altLang="en-US"/>
               <a:t>, never with </a:t>
             </a:r>
             <a:r>
-              <a:rPr lang="" altLang="en-US" b="1"/>
+              <a:rPr lang="en-US" altLang="en-US" b="1"/>
               <a:t>hypotheses</a:t>
             </a:r>
             <a:r>
-              <a:rPr lang="" altLang="en-US"/>
+              <a:rPr lang="en-US" altLang="en-US"/>
               <a:t> or </a:t>
             </a:r>
             <a:r>
-              <a:rPr lang="" altLang="en-US" b="1"/>
+              <a:rPr lang="en-US" altLang="en-US" b="1"/>
               <a:t>parameters</a:t>
             </a:r>
-            <a:endParaRPr lang="" altLang="en-US" b="1"/>
+            <a:endParaRPr lang="en-US" altLang="en-US" b="1"/>
           </a:p>
         </p:txBody>
       </p:sp>
@@ -11827,18 +13071,18 @@
           <a:bodyPr/>
           <a:p>
             <a:r>
-              <a:rPr lang="" altLang="en-US"/>
+              <a:rPr lang="en-US" altLang="en-US"/>
               <a:t>The </a:t>
             </a:r>
             <a:r>
-              <a:rPr lang="" altLang="en-US" i="1"/>
+              <a:rPr lang="en-US" altLang="en-US" i="1"/>
               <a:t>t </a:t>
             </a:r>
             <a:r>
-              <a:rPr lang="" altLang="en-US"/>
+              <a:rPr lang="en-US" altLang="en-US"/>
               <a:t>test (again)</a:t>
             </a:r>
-            <a:endParaRPr lang="" altLang="en-US"/>
+            <a:endParaRPr lang="en-US" altLang="en-US"/>
           </a:p>
         </p:txBody>
       </p:sp>
@@ -11857,44 +13101,44 @@
           <a:bodyPr/>
           <a:p>
             <a:r>
-              <a:rPr lang="" altLang="en-US"/>
+              <a:rPr lang="en-US" altLang="en-US"/>
               <a:t>The (true) mean of the data-generating process is </a:t>
             </a:r>
             <a:r>
-              <a:rPr lang="" altLang="en-US" b="1"/>
+              <a:rPr lang="en-US" altLang="en-US" b="1"/>
               <a:t>unknown</a:t>
             </a:r>
             <a:r>
-              <a:rPr lang="" altLang="en-US"/>
+              <a:rPr lang="en-US" altLang="en-US"/>
               <a:t> and </a:t>
             </a:r>
             <a:r>
-              <a:rPr lang="" altLang="en-US" b="1"/>
+              <a:rPr lang="en-US" altLang="en-US" b="1"/>
               <a:t>unknowable</a:t>
             </a:r>
-            <a:endParaRPr lang="" altLang="en-US"/>
-          </a:p>
-          <a:p>
-            <a:r>
-              <a:rPr lang="" altLang="en-US"/>
+            <a:endParaRPr lang="en-US" altLang="en-US"/>
+          </a:p>
+          <a:p>
+            <a:r>
+              <a:rPr lang="en-US" altLang="en-US"/>
               <a:t>It is a </a:t>
             </a:r>
             <a:r>
-              <a:rPr lang="" altLang="en-US" b="1"/>
+              <a:rPr lang="en-US" altLang="en-US" b="1"/>
               <a:t>parameter</a:t>
             </a:r>
             <a:r>
-              <a:rPr lang="" altLang="en-US"/>
+              <a:rPr lang="en-US" altLang="en-US"/>
               <a:t> that exists only in the mind of God</a:t>
             </a:r>
-            <a:endParaRPr lang="" altLang="en-US"/>
-          </a:p>
-          <a:p>
-            <a:r>
-              <a:rPr lang="" altLang="en-US"/>
+            <a:endParaRPr lang="en-US" altLang="en-US"/>
+          </a:p>
+          <a:p>
+            <a:r>
+              <a:rPr lang="en-US" altLang="en-US"/>
               <a:t>The reason we do statistics is to gain some kind of information about that parameter</a:t>
             </a:r>
-            <a:endParaRPr lang="" altLang="en-US"/>
+            <a:endParaRPr lang="en-US" altLang="en-US"/>
           </a:p>
         </p:txBody>
       </p:sp>
@@ -11952,18 +13196,18 @@
           <a:bodyPr/>
           <a:p>
             <a:r>
-              <a:rPr lang="" altLang="en-US"/>
+              <a:rPr lang="en-US" altLang="en-US"/>
               <a:t>The </a:t>
             </a:r>
             <a:r>
-              <a:rPr lang="" altLang="en-US" i="1"/>
+              <a:rPr lang="en-US" altLang="en-US" i="1"/>
               <a:t>t </a:t>
             </a:r>
             <a:r>
-              <a:rPr lang="" altLang="en-US"/>
+              <a:rPr lang="en-US" altLang="en-US"/>
               <a:t>test (again)</a:t>
             </a:r>
-            <a:endParaRPr lang="" altLang="en-US"/>
+            <a:endParaRPr lang="en-US" altLang="en-US"/>
           </a:p>
         </p:txBody>
       </p:sp>
@@ -11982,28 +13226,28 @@
           <a:bodyPr/>
           <a:p>
             <a:r>
-              <a:rPr lang="" altLang="en-US" b="1"/>
+              <a:rPr lang="en-US" altLang="en-US" b="1"/>
               <a:t>Why </a:t>
             </a:r>
             <a:r>
-              <a:rPr lang="" altLang="en-US"/>
+              <a:rPr lang="en-US" altLang="en-US"/>
               <a:t>do you divide the sample mean by the standard deviation?</a:t>
             </a:r>
-            <a:endParaRPr lang="" altLang="en-US"/>
-          </a:p>
-          <a:p>
-            <a:r>
-              <a:rPr lang="" altLang="en-US"/>
+            <a:endParaRPr lang="en-US" altLang="en-US"/>
+          </a:p>
+          <a:p>
+            <a:r>
+              <a:rPr lang="en-US" altLang="en-US"/>
               <a:t>Why do you calculate the sample mean at all??</a:t>
             </a:r>
-            <a:endParaRPr lang="" altLang="en-US"/>
-          </a:p>
-          <a:p>
-            <a:r>
-              <a:rPr lang="" altLang="en-US"/>
+            <a:endParaRPr lang="en-US" altLang="en-US"/>
+          </a:p>
+          <a:p>
+            <a:r>
+              <a:rPr lang="en-US" altLang="en-US"/>
               <a:t>What does the sample mean have to do with the actual, true, known-only-to-God mean?</a:t>
             </a:r>
-            <a:endParaRPr lang="" altLang="en-US"/>
+            <a:endParaRPr lang="en-US" altLang="en-US"/>
           </a:p>
         </p:txBody>
       </p:sp>
@@ -12062,10 +13306,10 @@
           <a:bodyPr/>
           <a:p>
             <a:r>
-              <a:rPr lang="" altLang="en-US"/>
+              <a:rPr lang="en-US" altLang="en-US"/>
               <a:t>Frequentist probability</a:t>
             </a:r>
-            <a:endParaRPr lang="" altLang="en-US"/>
+            <a:endParaRPr lang="en-US" altLang="en-US"/>
           </a:p>
         </p:txBody>
       </p:sp>
@@ -12084,66 +13328,66 @@
           <a:bodyPr/>
           <a:p>
             <a:r>
-              <a:rPr lang="" altLang="en-US"/>
+              <a:rPr lang="en-US" altLang="en-US"/>
               <a:t>Is </a:t>
             </a:r>
             <a:r>
-              <a:rPr lang="" altLang="en-US" b="1"/>
+              <a:rPr lang="en-US" altLang="en-US" b="1"/>
               <a:t>counterfactual</a:t>
             </a:r>
             <a:r>
-              <a:rPr lang="" altLang="en-US"/>
+              <a:rPr lang="en-US" altLang="en-US"/>
               <a:t>:</a:t>
             </a:r>
-            <a:endParaRPr lang="" altLang="en-US"/>
+            <a:endParaRPr lang="en-US" altLang="en-US"/>
           </a:p>
           <a:p>
             <a:pPr lvl="1"/>
             <a:r>
-              <a:rPr lang="" altLang="en-US"/>
+              <a:rPr lang="en-US" altLang="en-US"/>
               <a:t>Imagine that the true mean is actually 0.</a:t>
             </a:r>
-            <a:endParaRPr lang="" altLang="en-US"/>
+            <a:endParaRPr lang="en-US" altLang="en-US"/>
           </a:p>
           <a:p>
             <a:pPr lvl="1"/>
             <a:r>
-              <a:rPr lang="" altLang="en-US"/>
+              <a:rPr lang="en-US" altLang="en-US"/>
               <a:t>What </a:t>
             </a:r>
             <a:r>
-              <a:rPr lang="" altLang="en-US" b="1"/>
+              <a:rPr lang="en-US" altLang="en-US" b="1"/>
               <a:t>distribution </a:t>
             </a:r>
             <a:r>
-              <a:rPr lang="" altLang="en-US"/>
+              <a:rPr lang="en-US" altLang="en-US"/>
               <a:t>of sample means would you get under this zero-mean process?</a:t>
             </a:r>
-            <a:endParaRPr lang="" altLang="en-US"/>
+            <a:endParaRPr lang="en-US" altLang="en-US"/>
           </a:p>
           <a:p>
             <a:pPr lvl="0"/>
             <a:r>
-              <a:rPr lang="" altLang="en-US"/>
+              <a:rPr lang="en-US" altLang="en-US"/>
               <a:t>If observed mean is sufficiently different from these simulated means, we </a:t>
             </a:r>
             <a:r>
-              <a:rPr lang="" altLang="en-US" b="1"/>
+              <a:rPr lang="en-US" altLang="en-US" b="1"/>
               <a:t>reject the null hypothesis </a:t>
             </a:r>
             <a:r>
-              <a:rPr lang="" altLang="en-US"/>
+              <a:rPr lang="en-US" altLang="en-US"/>
               <a:t>of </a:t>
             </a:r>
             <a:r>
-              <a:rPr lang="" altLang="en-US" i="1"/>
+              <a:rPr lang="en-US" altLang="en-US" i="1"/>
               <a:t>mean </a:t>
             </a:r>
             <a:r>
-              <a:rPr lang="" altLang="en-US"/>
+              <a:rPr lang="en-US" altLang="en-US"/>
               <a:t>= 0.</a:t>
             </a:r>
-            <a:endParaRPr lang="" altLang="en-US"/>
+            <a:endParaRPr lang="en-US" altLang="en-US"/>
           </a:p>
         </p:txBody>
       </p:sp>
@@ -12201,10 +13445,10 @@
           <a:bodyPr/>
           <a:p>
             <a:r>
-              <a:rPr lang="" altLang="en-US"/>
+              <a:rPr lang="en-US" altLang="en-US"/>
               <a:t>Frequentist probability</a:t>
             </a:r>
-            <a:endParaRPr lang="" altLang="en-US"/>
+            <a:endParaRPr lang="en-US" altLang="en-US"/>
           </a:p>
         </p:txBody>
       </p:sp>
@@ -12223,65 +13467,65 @@
           <a:bodyPr/>
           <a:p>
             <a:r>
-              <a:rPr lang="" altLang="en-US"/>
+              <a:rPr lang="en-US" altLang="en-US"/>
               <a:t>What does this procedure tell you about the </a:t>
             </a:r>
             <a:r>
-              <a:rPr lang="" altLang="en-US" b="1"/>
+              <a:rPr lang="en-US" altLang="en-US" b="1"/>
               <a:t>actual </a:t>
             </a:r>
             <a:r>
-              <a:rPr lang="" altLang="en-US"/>
+              <a:rPr lang="en-US" altLang="en-US"/>
               <a:t>sample mean?</a:t>
             </a:r>
-            <a:endParaRPr lang="" altLang="en-US"/>
-          </a:p>
-          <a:p>
-            <a:r>
-              <a:rPr lang="" altLang="en-US"/>
+            <a:endParaRPr lang="en-US" altLang="en-US"/>
+          </a:p>
+          <a:p>
+            <a:r>
+              <a:rPr lang="en-US" altLang="en-US"/>
               <a:t>The </a:t>
             </a:r>
             <a:r>
-              <a:rPr lang="" altLang="en-US" i="1"/>
+              <a:rPr lang="en-US" altLang="en-US" i="1"/>
               <a:t>p </a:t>
             </a:r>
             <a:r>
-              <a:rPr lang="" altLang="en-US"/>
+              <a:rPr lang="en-US" altLang="en-US"/>
               <a:t>value is a statement about how likely the </a:t>
             </a:r>
             <a:r>
-              <a:rPr lang="" altLang="en-US" b="1"/>
+              <a:rPr lang="en-US" altLang="en-US" b="1"/>
               <a:t>data</a:t>
             </a:r>
             <a:r>
-              <a:rPr lang="" altLang="en-US"/>
+              <a:rPr lang="en-US" altLang="en-US"/>
               <a:t> is given a </a:t>
             </a:r>
             <a:r>
-              <a:rPr lang="" altLang="en-US" b="1"/>
+              <a:rPr lang="en-US" altLang="en-US" b="1"/>
               <a:t>hypothesis</a:t>
             </a:r>
             <a:r>
-              <a:rPr lang="" altLang="en-US"/>
+              <a:rPr lang="en-US" altLang="en-US"/>
               <a:t>:</a:t>
             </a:r>
-            <a:endParaRPr lang="" altLang="en-US"/>
+            <a:endParaRPr lang="en-US" altLang="en-US"/>
           </a:p>
           <a:p>
             <a:pPr lvl="1"/>
             <a:r>
-              <a:rPr lang="" altLang="en-US"/>
+              <a:rPr lang="en-US" altLang="en-US"/>
               <a:t>p(data | mean=0)</a:t>
             </a:r>
-            <a:endParaRPr lang="" altLang="en-US"/>
+            <a:endParaRPr lang="en-US" altLang="en-US"/>
           </a:p>
           <a:p>
             <a:pPr lvl="1"/>
             <a:r>
-              <a:rPr lang="" altLang="en-US"/>
+              <a:rPr lang="en-US" altLang="en-US"/>
               <a:t>(read this as “probability of the data given that the mean is 0”).</a:t>
             </a:r>
-            <a:endParaRPr lang="" altLang="en-US"/>
+            <a:endParaRPr lang="en-US" altLang="en-US"/>
           </a:p>
         </p:txBody>
       </p:sp>

</xml_diff>